<commit_message>
inversed some efficiency calcs. and cleaning
</commit_message>
<xml_diff>
--- a/documentation/Creating the transport model.pptx
+++ b/documentation/Creating the transport model.pptx
@@ -5,7 +5,7 @@
     <p:sldMasterId id="2147483648" r:id="rId1"/>
   </p:sldMasterIdLst>
   <p:notesMasterIdLst>
-    <p:notesMasterId r:id="rId20"/>
+    <p:notesMasterId r:id="rId21"/>
   </p:notesMasterIdLst>
   <p:sldIdLst>
     <p:sldId id="256" r:id="rId2"/>
@@ -13,19 +13,20 @@
     <p:sldId id="266" r:id="rId4"/>
     <p:sldId id="272" r:id="rId5"/>
     <p:sldId id="257" r:id="rId6"/>
-    <p:sldId id="259" r:id="rId7"/>
-    <p:sldId id="263" r:id="rId8"/>
-    <p:sldId id="264" r:id="rId9"/>
-    <p:sldId id="267" r:id="rId10"/>
-    <p:sldId id="273" r:id="rId11"/>
-    <p:sldId id="265" r:id="rId12"/>
-    <p:sldId id="258" r:id="rId13"/>
-    <p:sldId id="271" r:id="rId14"/>
-    <p:sldId id="269" r:id="rId15"/>
-    <p:sldId id="268" r:id="rId16"/>
-    <p:sldId id="262" r:id="rId17"/>
-    <p:sldId id="261" r:id="rId18"/>
-    <p:sldId id="260" r:id="rId19"/>
+    <p:sldId id="275" r:id="rId7"/>
+    <p:sldId id="259" r:id="rId8"/>
+    <p:sldId id="263" r:id="rId9"/>
+    <p:sldId id="264" r:id="rId10"/>
+    <p:sldId id="267" r:id="rId11"/>
+    <p:sldId id="273" r:id="rId12"/>
+    <p:sldId id="265" r:id="rId13"/>
+    <p:sldId id="258" r:id="rId14"/>
+    <p:sldId id="271" r:id="rId15"/>
+    <p:sldId id="269" r:id="rId16"/>
+    <p:sldId id="268" r:id="rId17"/>
+    <p:sldId id="262" r:id="rId18"/>
+    <p:sldId id="261" r:id="rId19"/>
+    <p:sldId id="260" r:id="rId20"/>
   </p:sldIdLst>
   <p:sldSz cx="12192000" cy="6858000"/>
   <p:notesSz cx="6858000" cy="9144000"/>
@@ -2556,7 +2557,7 @@
         <a:lstStyle/>
         <a:p>
           <a:r>
-            <a:rPr lang="en-SG" sz="1500"/>
+            <a:rPr lang="en-SG" sz="1500" dirty="0"/>
             <a:t>Base year data:</a:t>
           </a:r>
         </a:p>
@@ -2592,7 +2593,7 @@
         <a:lstStyle/>
         <a:p>
           <a:r>
-            <a:rPr lang="en-SG" sz="1500"/>
+            <a:rPr lang="en-SG" sz="1500" dirty="0"/>
             <a:t>Energy</a:t>
           </a:r>
         </a:p>
@@ -2628,7 +2629,7 @@
         <a:lstStyle/>
         <a:p>
           <a:r>
-            <a:rPr lang="en-SG" sz="1500"/>
+            <a:rPr lang="en-SG" sz="1500" dirty="0"/>
             <a:t>Freight tonne km</a:t>
           </a:r>
         </a:p>
@@ -2664,8 +2665,12 @@
         <a:lstStyle/>
         <a:p>
           <a:r>
-            <a:rPr lang="en-SG" sz="1500"/>
-            <a:t>Passsenger km</a:t>
+            <a:rPr lang="en-SG" sz="1500" dirty="0" err="1"/>
+            <a:t>Passsenger</a:t>
+          </a:r>
+          <a:r>
+            <a:rPr lang="en-SG" sz="1500" dirty="0"/>
+            <a:t> km</a:t>
           </a:r>
         </a:p>
       </dgm:t>
@@ -2700,8 +2705,8 @@
         <a:lstStyle/>
         <a:p>
           <a:r>
-            <a:rPr lang="en-SG" sz="1500"/>
-            <a:t>Energy use by drive type</a:t>
+            <a:rPr lang="en-SG" sz="1500" dirty="0"/>
+            <a:t>Energy use by drive type (road only)</a:t>
           </a:r>
         </a:p>
       </dgm:t>
@@ -2736,7 +2741,7 @@
         <a:lstStyle/>
         <a:p>
           <a:r>
-            <a:rPr lang="en-SG" sz="1500"/>
+            <a:rPr lang="en-SG" sz="1500" dirty="0"/>
             <a:t>Energy use by fuel type</a:t>
           </a:r>
         </a:p>
@@ -2772,7 +2777,7 @@
         <a:lstStyle/>
         <a:p>
           <a:r>
-            <a:rPr lang="en-SG" sz="1500"/>
+            <a:rPr lang="en-SG" sz="1500" dirty="0"/>
             <a:t>Activity</a:t>
           </a:r>
         </a:p>
@@ -2808,8 +2813,8 @@
         <a:lstStyle/>
         <a:p>
           <a:r>
-            <a:rPr lang="en-SG" sz="1500"/>
-            <a:t>Turnover rates</a:t>
+            <a:rPr lang="en-SG" sz="1500" dirty="0"/>
+            <a:t>Turnover rates (road only)</a:t>
           </a:r>
         </a:p>
       </dgm:t>
@@ -2844,8 +2849,8 @@
         <a:lstStyle/>
         <a:p>
           <a:r>
-            <a:rPr lang="en-SG" sz="1500"/>
-            <a:t>Occupancy and load factors</a:t>
+            <a:rPr lang="en-SG" sz="1500" dirty="0"/>
+            <a:t>Occupancy and load factors (road only)</a:t>
           </a:r>
         </a:p>
       </dgm:t>
@@ -2880,8 +2885,8 @@
         <a:lstStyle/>
         <a:p>
           <a:r>
-            <a:rPr lang="en-SG" sz="1500"/>
-            <a:t>New vehicle efficiency</a:t>
+            <a:rPr lang="en-SG" sz="1500" dirty="0"/>
+            <a:t>New vehicle efficiency (road only)</a:t>
           </a:r>
         </a:p>
       </dgm:t>
@@ -2908,7 +2913,7 @@
         </a:p>
       </dgm:t>
     </dgm:pt>
-    <dgm:pt modelId="{ECC8D15F-9ED1-4325-B95E-8D7C579B63EE}">
+    <dgm:pt modelId="{B5989953-7F94-4BCC-8F21-2B87D0CC7209}">
       <dgm:prSet phldrT="[Text]" custT="1"/>
       <dgm:spPr/>
       <dgm:t>
@@ -2917,48 +2922,7 @@
         <a:p>
           <a:r>
             <a:rPr lang="en-SG" sz="1500" dirty="0"/>
-            <a:t>Non </a:t>
-          </a:r>
-          <a:r>
-            <a:rPr lang="en-SG" sz="1500"/>
-            <a:t>road efficiency</a:t>
-          </a:r>
-          <a:endParaRPr lang="en-SG" sz="1500" dirty="0"/>
-        </a:p>
-      </dgm:t>
-    </dgm:pt>
-    <dgm:pt modelId="{EEA5A19C-28D1-401E-9728-006490C78CF1}" type="parTrans" cxnId="{6A6FDA71-CD5E-479A-B76F-2B1B9249F10A}">
-      <dgm:prSet/>
-      <dgm:spPr/>
-      <dgm:t>
-        <a:bodyPr/>
-        <a:lstStyle/>
-        <a:p>
-          <a:endParaRPr lang="en-SG" sz="1500"/>
-        </a:p>
-      </dgm:t>
-    </dgm:pt>
-    <dgm:pt modelId="{0C021CE0-1580-4590-B113-FFF5A36455E5}" type="sibTrans" cxnId="{6A6FDA71-CD5E-479A-B76F-2B1B9249F10A}">
-      <dgm:prSet/>
-      <dgm:spPr/>
-      <dgm:t>
-        <a:bodyPr/>
-        <a:lstStyle/>
-        <a:p>
-          <a:endParaRPr lang="en-SG"/>
-        </a:p>
-      </dgm:t>
-    </dgm:pt>
-    <dgm:pt modelId="{B5989953-7F94-4BCC-8F21-2B87D0CC7209}">
-      <dgm:prSet phldrT="[Text]" custT="1"/>
-      <dgm:spPr/>
-      <dgm:t>
-        <a:bodyPr/>
-        <a:lstStyle/>
-        <a:p>
-          <a:r>
-            <a:rPr lang="en-SG" sz="1500"/>
-            <a:t>Stocks</a:t>
+            <a:t>Stocks (road only)</a:t>
           </a:r>
         </a:p>
       </dgm:t>
@@ -3011,6 +2975,78 @@
       </dgm:t>
     </dgm:pt>
     <dgm:pt modelId="{89CBF129-C474-4825-9E32-318991B67934}" type="sibTrans" cxnId="{3579467B-684B-4C1C-B88B-31AF62FBEA95}">
+      <dgm:prSet/>
+      <dgm:spPr/>
+      <dgm:t>
+        <a:bodyPr/>
+        <a:lstStyle/>
+        <a:p>
+          <a:endParaRPr lang="en-SG"/>
+        </a:p>
+      </dgm:t>
+    </dgm:pt>
+    <dgm:pt modelId="{93206431-A577-4A65-8D7B-886AE0B9F00F}">
+      <dgm:prSet phldrT="[Text]" custT="1"/>
+      <dgm:spPr/>
+      <dgm:t>
+        <a:bodyPr/>
+        <a:lstStyle/>
+        <a:p>
+          <a:r>
+            <a:rPr lang="en-SG" sz="1500" dirty="0"/>
+            <a:t>Fuel mixing (e.g. biofuel mix %)</a:t>
+          </a:r>
+        </a:p>
+      </dgm:t>
+    </dgm:pt>
+    <dgm:pt modelId="{CD948D6D-722D-4E96-B8AB-6784745B333E}" type="parTrans" cxnId="{411A489A-9A69-41AB-849F-BF8D66BEA29B}">
+      <dgm:prSet/>
+      <dgm:spPr/>
+      <dgm:t>
+        <a:bodyPr/>
+        <a:lstStyle/>
+        <a:p>
+          <a:endParaRPr lang="en-SG"/>
+        </a:p>
+      </dgm:t>
+    </dgm:pt>
+    <dgm:pt modelId="{D0662E1B-C68C-449C-A568-35F4AF831264}" type="sibTrans" cxnId="{411A489A-9A69-41AB-849F-BF8D66BEA29B}">
+      <dgm:prSet/>
+      <dgm:spPr/>
+      <dgm:t>
+        <a:bodyPr/>
+        <a:lstStyle/>
+        <a:p>
+          <a:endParaRPr lang="en-SG"/>
+        </a:p>
+      </dgm:t>
+    </dgm:pt>
+    <dgm:pt modelId="{80CA23FE-A49A-4E7F-A225-B06A43FFA962}">
+      <dgm:prSet phldrT="[Text]" custT="1"/>
+      <dgm:spPr/>
+      <dgm:t>
+        <a:bodyPr/>
+        <a:lstStyle/>
+        <a:p>
+          <a:r>
+            <a:rPr lang="en-SG" sz="1500" dirty="0"/>
+            <a:t>Hybrid electricity usage % (road only)</a:t>
+          </a:r>
+        </a:p>
+      </dgm:t>
+    </dgm:pt>
+    <dgm:pt modelId="{D4B1C904-82C9-4D9E-931D-0B91E599EE1F}" type="parTrans" cxnId="{9DE32ABC-9764-42F1-AC1A-99816AECC3B5}">
+      <dgm:prSet/>
+      <dgm:spPr/>
+      <dgm:t>
+        <a:bodyPr/>
+        <a:lstStyle/>
+        <a:p>
+          <a:endParaRPr lang="en-SG"/>
+        </a:p>
+      </dgm:t>
+    </dgm:pt>
+    <dgm:pt modelId="{5868BB1B-D91C-4151-8E81-BB79DFEF52F3}" type="sibTrans" cxnId="{9DE32ABC-9764-42F1-AC1A-99816AECC3B5}">
       <dgm:prSet/>
       <dgm:spPr/>
       <dgm:t>
@@ -3095,7 +3131,7 @@
       <dgm:spPr/>
     </dgm:pt>
     <dgm:pt modelId="{608A02E8-7A4E-473A-8729-05B0AFB15C9D}" type="pres">
-      <dgm:prSet presAssocID="{A6B01058-23B1-4275-8252-D15DA5DF77CB}" presName="Name64" presStyleLbl="parChTrans1D3" presStyleIdx="0" presStyleCnt="7"/>
+      <dgm:prSet presAssocID="{A6B01058-23B1-4275-8252-D15DA5DF77CB}" presName="Name64" presStyleLbl="parChTrans1D3" presStyleIdx="0" presStyleCnt="9"/>
       <dgm:spPr/>
     </dgm:pt>
     <dgm:pt modelId="{BFC56123-EC16-4CFF-8104-E901A58AF757}" type="pres">
@@ -3111,7 +3147,7 @@
       <dgm:spPr/>
     </dgm:pt>
     <dgm:pt modelId="{AB12C268-67EE-4FDF-A87A-0E273608076B}" type="pres">
-      <dgm:prSet presAssocID="{E13AC13E-F23F-4B96-BBD0-BAC7C17F321B}" presName="rootText" presStyleLbl="node3" presStyleIdx="0" presStyleCnt="7">
+      <dgm:prSet presAssocID="{E13AC13E-F23F-4B96-BBD0-BAC7C17F321B}" presName="rootText" presStyleLbl="node3" presStyleIdx="0" presStyleCnt="9">
         <dgm:presLayoutVars>
           <dgm:chPref val="3"/>
         </dgm:presLayoutVars>
@@ -3119,7 +3155,7 @@
       <dgm:spPr/>
     </dgm:pt>
     <dgm:pt modelId="{33CA2607-B3AD-4AF6-9C83-6BDD01967ADB}" type="pres">
-      <dgm:prSet presAssocID="{E13AC13E-F23F-4B96-BBD0-BAC7C17F321B}" presName="rootConnector" presStyleLbl="node3" presStyleIdx="0" presStyleCnt="7"/>
+      <dgm:prSet presAssocID="{E13AC13E-F23F-4B96-BBD0-BAC7C17F321B}" presName="rootConnector" presStyleLbl="node3" presStyleIdx="0" presStyleCnt="9"/>
       <dgm:spPr/>
     </dgm:pt>
     <dgm:pt modelId="{282BC3A7-6CD2-4BC6-A9EB-AE9738AB3CC0}" type="pres">
@@ -3131,7 +3167,7 @@
       <dgm:spPr/>
     </dgm:pt>
     <dgm:pt modelId="{85207240-C0E6-41FE-9FCA-002B8013F185}" type="pres">
-      <dgm:prSet presAssocID="{3B4951CB-194C-4200-91E3-C60187B48B60}" presName="Name64" presStyleLbl="parChTrans1D3" presStyleIdx="1" presStyleCnt="7"/>
+      <dgm:prSet presAssocID="{3B4951CB-194C-4200-91E3-C60187B48B60}" presName="Name64" presStyleLbl="parChTrans1D3" presStyleIdx="1" presStyleCnt="9"/>
       <dgm:spPr/>
     </dgm:pt>
     <dgm:pt modelId="{9FDA92E4-4A97-49FC-94F0-C07CF0B35C07}" type="pres">
@@ -3147,7 +3183,7 @@
       <dgm:spPr/>
     </dgm:pt>
     <dgm:pt modelId="{4E79214B-AE78-4A18-BF84-9B8E3F6105F1}" type="pres">
-      <dgm:prSet presAssocID="{73B933D3-F340-4A09-8414-1A4F24F833BC}" presName="rootText" presStyleLbl="node3" presStyleIdx="1" presStyleCnt="7">
+      <dgm:prSet presAssocID="{73B933D3-F340-4A09-8414-1A4F24F833BC}" presName="rootText" presStyleLbl="node3" presStyleIdx="1" presStyleCnt="9">
         <dgm:presLayoutVars>
           <dgm:chPref val="3"/>
         </dgm:presLayoutVars>
@@ -3155,7 +3191,7 @@
       <dgm:spPr/>
     </dgm:pt>
     <dgm:pt modelId="{538A3C8B-4526-4CDA-BE38-92D4C6E63CDF}" type="pres">
-      <dgm:prSet presAssocID="{73B933D3-F340-4A09-8414-1A4F24F833BC}" presName="rootConnector" presStyleLbl="node3" presStyleIdx="1" presStyleCnt="7"/>
+      <dgm:prSet presAssocID="{73B933D3-F340-4A09-8414-1A4F24F833BC}" presName="rootConnector" presStyleLbl="node3" presStyleIdx="1" presStyleCnt="9"/>
       <dgm:spPr/>
     </dgm:pt>
     <dgm:pt modelId="{3FBF637F-24E6-42E5-8E6D-F9A760267D15}" type="pres">
@@ -3203,7 +3239,7 @@
       <dgm:spPr/>
     </dgm:pt>
     <dgm:pt modelId="{B0744E59-15CA-4D05-9A4E-E55BCB326F27}" type="pres">
-      <dgm:prSet presAssocID="{D0ECFB41-45A9-4126-8EE8-3A5ECF7BF324}" presName="Name64" presStyleLbl="parChTrans1D3" presStyleIdx="2" presStyleCnt="7"/>
+      <dgm:prSet presAssocID="{D0ECFB41-45A9-4126-8EE8-3A5ECF7BF324}" presName="Name64" presStyleLbl="parChTrans1D3" presStyleIdx="2" presStyleCnt="9"/>
       <dgm:spPr/>
     </dgm:pt>
     <dgm:pt modelId="{5CCB4162-F295-4172-895F-E640F4D8EDF1}" type="pres">
@@ -3219,7 +3255,7 @@
       <dgm:spPr/>
     </dgm:pt>
     <dgm:pt modelId="{BC9CBE9A-F4A2-4A21-9D53-4EC382D0FEDD}" type="pres">
-      <dgm:prSet presAssocID="{AD218CB3-1A69-4E47-AD75-2E465EA9CB64}" presName="rootText" presStyleLbl="node3" presStyleIdx="2" presStyleCnt="7">
+      <dgm:prSet presAssocID="{AD218CB3-1A69-4E47-AD75-2E465EA9CB64}" presName="rootText" presStyleLbl="node3" presStyleIdx="2" presStyleCnt="9">
         <dgm:presLayoutVars>
           <dgm:chPref val="3"/>
         </dgm:presLayoutVars>
@@ -3227,15 +3263,19 @@
       <dgm:spPr/>
     </dgm:pt>
     <dgm:pt modelId="{76FDB8A8-5717-4B96-9798-3FFEDEEE5403}" type="pres">
-      <dgm:prSet presAssocID="{AD218CB3-1A69-4E47-AD75-2E465EA9CB64}" presName="rootConnector" presStyleLbl="node3" presStyleIdx="2" presStyleCnt="7"/>
+      <dgm:prSet presAssocID="{AD218CB3-1A69-4E47-AD75-2E465EA9CB64}" presName="rootConnector" presStyleLbl="node3" presStyleIdx="2" presStyleCnt="9"/>
       <dgm:spPr/>
     </dgm:pt>
     <dgm:pt modelId="{FF8BBFCC-2544-4A03-91BB-1BAE6873A701}" type="pres">
       <dgm:prSet presAssocID="{AD218CB3-1A69-4E47-AD75-2E465EA9CB64}" presName="hierChild4" presStyleCnt="0"/>
       <dgm:spPr/>
     </dgm:pt>
+    <dgm:pt modelId="{4D8EA0AF-27C3-4232-9B31-78D13993AE3C}" type="pres">
+      <dgm:prSet presAssocID="{AD218CB3-1A69-4E47-AD75-2E465EA9CB64}" presName="hierChild5" presStyleCnt="0"/>
+      <dgm:spPr/>
+    </dgm:pt>
     <dgm:pt modelId="{A98802D8-3CB8-483C-9395-C0AABC947EDF}" type="pres">
-      <dgm:prSet presAssocID="{09456824-2C5F-44E2-937A-6004280FD57B}" presName="Name64" presStyleLbl="parChTrans1D4" presStyleIdx="0" presStyleCnt="1"/>
+      <dgm:prSet presAssocID="{09456824-2C5F-44E2-937A-6004280FD57B}" presName="Name64" presStyleLbl="parChTrans1D3" presStyleIdx="3" presStyleCnt="9"/>
       <dgm:spPr/>
     </dgm:pt>
     <dgm:pt modelId="{C00272D7-B963-43F3-A304-A5ABF9CB085D}" type="pres">
@@ -3251,7 +3291,7 @@
       <dgm:spPr/>
     </dgm:pt>
     <dgm:pt modelId="{952258F3-7A3E-439D-A889-C893A783FC7F}" type="pres">
-      <dgm:prSet presAssocID="{45490CCA-8F70-42B6-B540-3D8A6936C741}" presName="rootText" presStyleLbl="node4" presStyleIdx="0" presStyleCnt="1">
+      <dgm:prSet presAssocID="{45490CCA-8F70-42B6-B540-3D8A6936C741}" presName="rootText" presStyleLbl="node3" presStyleIdx="3" presStyleCnt="9">
         <dgm:presLayoutVars>
           <dgm:chPref val="3"/>
         </dgm:presLayoutVars>
@@ -3259,7 +3299,7 @@
       <dgm:spPr/>
     </dgm:pt>
     <dgm:pt modelId="{30A755E2-7B97-4AB1-B46B-E8EE4FED09FD}" type="pres">
-      <dgm:prSet presAssocID="{45490CCA-8F70-42B6-B540-3D8A6936C741}" presName="rootConnector" presStyleLbl="node4" presStyleIdx="0" presStyleCnt="1"/>
+      <dgm:prSet presAssocID="{45490CCA-8F70-42B6-B540-3D8A6936C741}" presName="rootConnector" presStyleLbl="node3" presStyleIdx="3" presStyleCnt="9"/>
       <dgm:spPr/>
     </dgm:pt>
     <dgm:pt modelId="{165AB3CC-0481-4742-9DDA-26FB376A2F87}" type="pres">
@@ -3268,10 +3308,6 @@
     </dgm:pt>
     <dgm:pt modelId="{D51497DA-E14D-4E00-B256-45CA594E4800}" type="pres">
       <dgm:prSet presAssocID="{45490CCA-8F70-42B6-B540-3D8A6936C741}" presName="hierChild5" presStyleCnt="0"/>
-      <dgm:spPr/>
-    </dgm:pt>
-    <dgm:pt modelId="{4D8EA0AF-27C3-4232-9B31-78D13993AE3C}" type="pres">
-      <dgm:prSet presAssocID="{AD218CB3-1A69-4E47-AD75-2E465EA9CB64}" presName="hierChild5" presStyleCnt="0"/>
       <dgm:spPr/>
     </dgm:pt>
     <dgm:pt modelId="{27B471F1-F27B-40D3-AF18-5D64EFE6DA10}" type="pres">
@@ -3347,7 +3383,7 @@
       <dgm:spPr/>
     </dgm:pt>
     <dgm:pt modelId="{DD868811-05F1-475D-955C-E855ECF648A5}" type="pres">
-      <dgm:prSet presAssocID="{F207E862-2444-4F4E-8112-1C209C0C6E0D}" presName="Name64" presStyleLbl="parChTrans1D3" presStyleIdx="3" presStyleCnt="7"/>
+      <dgm:prSet presAssocID="{F207E862-2444-4F4E-8112-1C209C0C6E0D}" presName="Name64" presStyleLbl="parChTrans1D3" presStyleIdx="4" presStyleCnt="9"/>
       <dgm:spPr/>
     </dgm:pt>
     <dgm:pt modelId="{DF7B9F49-BB88-44A8-BDA2-2E865827A155}" type="pres">
@@ -3363,7 +3399,7 @@
       <dgm:spPr/>
     </dgm:pt>
     <dgm:pt modelId="{BA2A8497-6940-4B72-878A-0D81DFD00DF7}" type="pres">
-      <dgm:prSet presAssocID="{17B473CC-5604-4D29-B52A-3FB265F41F0F}" presName="rootText" presStyleLbl="node3" presStyleIdx="3" presStyleCnt="7">
+      <dgm:prSet presAssocID="{17B473CC-5604-4D29-B52A-3FB265F41F0F}" presName="rootText" presStyleLbl="node3" presStyleIdx="4" presStyleCnt="9">
         <dgm:presLayoutVars>
           <dgm:chPref val="3"/>
         </dgm:presLayoutVars>
@@ -3371,7 +3407,7 @@
       <dgm:spPr/>
     </dgm:pt>
     <dgm:pt modelId="{1C7A1B66-F15E-4515-AC2F-BBC49BD17F69}" type="pres">
-      <dgm:prSet presAssocID="{17B473CC-5604-4D29-B52A-3FB265F41F0F}" presName="rootConnector" presStyleLbl="node3" presStyleIdx="3" presStyleCnt="7"/>
+      <dgm:prSet presAssocID="{17B473CC-5604-4D29-B52A-3FB265F41F0F}" presName="rootConnector" presStyleLbl="node3" presStyleIdx="4" presStyleCnt="9"/>
       <dgm:spPr/>
     </dgm:pt>
     <dgm:pt modelId="{CA6330C5-40A7-45AD-B719-0172BC0C418E}" type="pres">
@@ -3383,7 +3419,7 @@
       <dgm:spPr/>
     </dgm:pt>
     <dgm:pt modelId="{7F427D50-E838-47C4-AB62-5ADEAB32FCD9}" type="pres">
-      <dgm:prSet presAssocID="{78B2311B-DF33-49DD-BE8C-7F37E04D510F}" presName="Name64" presStyleLbl="parChTrans1D3" presStyleIdx="4" presStyleCnt="7"/>
+      <dgm:prSet presAssocID="{78B2311B-DF33-49DD-BE8C-7F37E04D510F}" presName="Name64" presStyleLbl="parChTrans1D3" presStyleIdx="5" presStyleCnt="9"/>
       <dgm:spPr/>
     </dgm:pt>
     <dgm:pt modelId="{91648505-FC16-4C44-B9F6-E942A5D517BA}" type="pres">
@@ -3399,7 +3435,7 @@
       <dgm:spPr/>
     </dgm:pt>
     <dgm:pt modelId="{DBE83B29-5E1E-467E-A745-7B27708AFD8C}" type="pres">
-      <dgm:prSet presAssocID="{7AE60BE0-9E4C-4F95-BD0B-97233CE80452}" presName="rootText" presStyleLbl="node3" presStyleIdx="4" presStyleCnt="7">
+      <dgm:prSet presAssocID="{7AE60BE0-9E4C-4F95-BD0B-97233CE80452}" presName="rootText" presStyleLbl="node3" presStyleIdx="5" presStyleCnt="9">
         <dgm:presLayoutVars>
           <dgm:chPref val="3"/>
         </dgm:presLayoutVars>
@@ -3407,7 +3443,7 @@
       <dgm:spPr/>
     </dgm:pt>
     <dgm:pt modelId="{182267B8-763E-42E3-802D-C4258D9EA806}" type="pres">
-      <dgm:prSet presAssocID="{7AE60BE0-9E4C-4F95-BD0B-97233CE80452}" presName="rootConnector" presStyleLbl="node3" presStyleIdx="4" presStyleCnt="7"/>
+      <dgm:prSet presAssocID="{7AE60BE0-9E4C-4F95-BD0B-97233CE80452}" presName="rootConnector" presStyleLbl="node3" presStyleIdx="5" presStyleCnt="9"/>
       <dgm:spPr/>
     </dgm:pt>
     <dgm:pt modelId="{D039FE16-2715-4DD9-9EE5-D3ED1528F0C7}" type="pres">
@@ -3419,7 +3455,7 @@
       <dgm:spPr/>
     </dgm:pt>
     <dgm:pt modelId="{DA23D161-A42E-43F8-B9C3-B29598F0605D}" type="pres">
-      <dgm:prSet presAssocID="{CB6537DD-E1F8-46A8-B5B9-41A732E6F5C9}" presName="Name64" presStyleLbl="parChTrans1D3" presStyleIdx="5" presStyleCnt="7"/>
+      <dgm:prSet presAssocID="{CB6537DD-E1F8-46A8-B5B9-41A732E6F5C9}" presName="Name64" presStyleLbl="parChTrans1D3" presStyleIdx="6" presStyleCnt="9"/>
       <dgm:spPr/>
     </dgm:pt>
     <dgm:pt modelId="{862790A9-C84A-4D0F-9992-4FAEED445928}" type="pres">
@@ -3435,7 +3471,7 @@
       <dgm:spPr/>
     </dgm:pt>
     <dgm:pt modelId="{478FA14F-17B9-4C3C-B3CD-A9A00FD127CD}" type="pres">
-      <dgm:prSet presAssocID="{0CE66462-EBC6-4B26-9E25-1916F40C52B0}" presName="rootText" presStyleLbl="node3" presStyleIdx="5" presStyleCnt="7">
+      <dgm:prSet presAssocID="{0CE66462-EBC6-4B26-9E25-1916F40C52B0}" presName="rootText" presStyleLbl="node3" presStyleIdx="6" presStyleCnt="9">
         <dgm:presLayoutVars>
           <dgm:chPref val="3"/>
         </dgm:presLayoutVars>
@@ -3443,7 +3479,7 @@
       <dgm:spPr/>
     </dgm:pt>
     <dgm:pt modelId="{3F4DC0F8-45EF-4B63-869E-499BBA13C581}" type="pres">
-      <dgm:prSet presAssocID="{0CE66462-EBC6-4B26-9E25-1916F40C52B0}" presName="rootConnector" presStyleLbl="node3" presStyleIdx="5" presStyleCnt="7"/>
+      <dgm:prSet presAssocID="{0CE66462-EBC6-4B26-9E25-1916F40C52B0}" presName="rootConnector" presStyleLbl="node3" presStyleIdx="6" presStyleCnt="9"/>
       <dgm:spPr/>
     </dgm:pt>
     <dgm:pt modelId="{6C765052-465B-4319-ABC1-EFAB53BBBDD9}" type="pres">
@@ -3454,40 +3490,76 @@
       <dgm:prSet presAssocID="{0CE66462-EBC6-4B26-9E25-1916F40C52B0}" presName="hierChild5" presStyleCnt="0"/>
       <dgm:spPr/>
     </dgm:pt>
-    <dgm:pt modelId="{76F5343C-832C-4902-9DD1-019DF4ADE6F3}" type="pres">
-      <dgm:prSet presAssocID="{EEA5A19C-28D1-401E-9728-006490C78CF1}" presName="Name64" presStyleLbl="parChTrans1D3" presStyleIdx="6" presStyleCnt="7"/>
-      <dgm:spPr/>
-    </dgm:pt>
-    <dgm:pt modelId="{0ACD393B-0CC2-402B-8C12-6D9E7D8D81E1}" type="pres">
-      <dgm:prSet presAssocID="{ECC8D15F-9ED1-4325-B95E-8D7C579B63EE}" presName="hierRoot2" presStyleCnt="0">
+    <dgm:pt modelId="{E7D06081-E8B9-4481-A220-83A839937B9C}" type="pres">
+      <dgm:prSet presAssocID="{CD948D6D-722D-4E96-B8AB-6784745B333E}" presName="Name64" presStyleLbl="parChTrans1D3" presStyleIdx="7" presStyleCnt="9"/>
+      <dgm:spPr/>
+    </dgm:pt>
+    <dgm:pt modelId="{4715F000-CC26-4F87-A43D-CBB163D76D0A}" type="pres">
+      <dgm:prSet presAssocID="{93206431-A577-4A65-8D7B-886AE0B9F00F}" presName="hierRoot2" presStyleCnt="0">
         <dgm:presLayoutVars>
           <dgm:hierBranch val="init"/>
         </dgm:presLayoutVars>
       </dgm:prSet>
       <dgm:spPr/>
     </dgm:pt>
-    <dgm:pt modelId="{46732A59-C195-4178-A9D8-8AACF2BF7F13}" type="pres">
-      <dgm:prSet presAssocID="{ECC8D15F-9ED1-4325-B95E-8D7C579B63EE}" presName="rootComposite" presStyleCnt="0"/>
-      <dgm:spPr/>
-    </dgm:pt>
-    <dgm:pt modelId="{F64C9670-F9D3-4B2E-950B-F708FDA3711F}" type="pres">
-      <dgm:prSet presAssocID="{ECC8D15F-9ED1-4325-B95E-8D7C579B63EE}" presName="rootText" presStyleLbl="node3" presStyleIdx="6" presStyleCnt="7">
+    <dgm:pt modelId="{71333ABA-AD11-423B-A4F9-1EE8E563A346}" type="pres">
+      <dgm:prSet presAssocID="{93206431-A577-4A65-8D7B-886AE0B9F00F}" presName="rootComposite" presStyleCnt="0"/>
+      <dgm:spPr/>
+    </dgm:pt>
+    <dgm:pt modelId="{5DF909A4-D1DD-4AAF-BFEC-DC2028097CB7}" type="pres">
+      <dgm:prSet presAssocID="{93206431-A577-4A65-8D7B-886AE0B9F00F}" presName="rootText" presStyleLbl="node3" presStyleIdx="7" presStyleCnt="9">
         <dgm:presLayoutVars>
           <dgm:chPref val="3"/>
         </dgm:presLayoutVars>
       </dgm:prSet>
       <dgm:spPr/>
     </dgm:pt>
-    <dgm:pt modelId="{63AC51AD-5405-4C3C-BB58-ECD43DD9BC74}" type="pres">
-      <dgm:prSet presAssocID="{ECC8D15F-9ED1-4325-B95E-8D7C579B63EE}" presName="rootConnector" presStyleLbl="node3" presStyleIdx="6" presStyleCnt="7"/>
-      <dgm:spPr/>
-    </dgm:pt>
-    <dgm:pt modelId="{39E75698-0381-412D-9461-393EEF3EB8BD}" type="pres">
-      <dgm:prSet presAssocID="{ECC8D15F-9ED1-4325-B95E-8D7C579B63EE}" presName="hierChild4" presStyleCnt="0"/>
-      <dgm:spPr/>
-    </dgm:pt>
-    <dgm:pt modelId="{794E50D5-4EF2-4AD8-AD48-65C9C3A746DD}" type="pres">
-      <dgm:prSet presAssocID="{ECC8D15F-9ED1-4325-B95E-8D7C579B63EE}" presName="hierChild5" presStyleCnt="0"/>
+    <dgm:pt modelId="{CCA0430B-342D-4BF5-9448-2D0B17D3AAC2}" type="pres">
+      <dgm:prSet presAssocID="{93206431-A577-4A65-8D7B-886AE0B9F00F}" presName="rootConnector" presStyleLbl="node3" presStyleIdx="7" presStyleCnt="9"/>
+      <dgm:spPr/>
+    </dgm:pt>
+    <dgm:pt modelId="{46F0A429-A68F-43BF-9F9E-BB70B51AC01F}" type="pres">
+      <dgm:prSet presAssocID="{93206431-A577-4A65-8D7B-886AE0B9F00F}" presName="hierChild4" presStyleCnt="0"/>
+      <dgm:spPr/>
+    </dgm:pt>
+    <dgm:pt modelId="{BB87CF56-76EB-438F-8050-171648516A30}" type="pres">
+      <dgm:prSet presAssocID="{93206431-A577-4A65-8D7B-886AE0B9F00F}" presName="hierChild5" presStyleCnt="0"/>
+      <dgm:spPr/>
+    </dgm:pt>
+    <dgm:pt modelId="{22E1D864-F655-44C9-A45B-3E8E447AF08F}" type="pres">
+      <dgm:prSet presAssocID="{D4B1C904-82C9-4D9E-931D-0B91E599EE1F}" presName="Name64" presStyleLbl="parChTrans1D3" presStyleIdx="8" presStyleCnt="9"/>
+      <dgm:spPr/>
+    </dgm:pt>
+    <dgm:pt modelId="{6C62DFFE-455F-4CF7-8466-C9369135DB16}" type="pres">
+      <dgm:prSet presAssocID="{80CA23FE-A49A-4E7F-A225-B06A43FFA962}" presName="hierRoot2" presStyleCnt="0">
+        <dgm:presLayoutVars>
+          <dgm:hierBranch val="init"/>
+        </dgm:presLayoutVars>
+      </dgm:prSet>
+      <dgm:spPr/>
+    </dgm:pt>
+    <dgm:pt modelId="{88D2388B-5CA9-408F-9E87-EB115D4B181B}" type="pres">
+      <dgm:prSet presAssocID="{80CA23FE-A49A-4E7F-A225-B06A43FFA962}" presName="rootComposite" presStyleCnt="0"/>
+      <dgm:spPr/>
+    </dgm:pt>
+    <dgm:pt modelId="{72D08835-297A-4D3F-AFF0-01081D88A8DD}" type="pres">
+      <dgm:prSet presAssocID="{80CA23FE-A49A-4E7F-A225-B06A43FFA962}" presName="rootText" presStyleLbl="node3" presStyleIdx="8" presStyleCnt="9">
+        <dgm:presLayoutVars>
+          <dgm:chPref val="3"/>
+        </dgm:presLayoutVars>
+      </dgm:prSet>
+      <dgm:spPr/>
+    </dgm:pt>
+    <dgm:pt modelId="{388EA3A7-10E7-499F-97AD-8A7A6FBF9901}" type="pres">
+      <dgm:prSet presAssocID="{80CA23FE-A49A-4E7F-A225-B06A43FFA962}" presName="rootConnector" presStyleLbl="node3" presStyleIdx="8" presStyleCnt="9"/>
+      <dgm:spPr/>
+    </dgm:pt>
+    <dgm:pt modelId="{45510BA6-941A-4468-BC8A-FFDE5E16E0AA}" type="pres">
+      <dgm:prSet presAssocID="{80CA23FE-A49A-4E7F-A225-B06A43FFA962}" presName="hierChild4" presStyleCnt="0"/>
+      <dgm:spPr/>
+    </dgm:pt>
+    <dgm:pt modelId="{0445EBD1-EBF9-4E56-AC42-D0DE9AADB4F4}" type="pres">
+      <dgm:prSet presAssocID="{80CA23FE-A49A-4E7F-A225-B06A43FFA962}" presName="hierChild5" presStyleCnt="0"/>
       <dgm:spPr/>
     </dgm:pt>
     <dgm:pt modelId="{E9B3C465-88D3-4FFD-9FE5-E60412F6D603}" type="pres">
@@ -3500,9 +3572,8 @@
     </dgm:pt>
   </dgm:ptLst>
   <dgm:cxnLst>
-    <dgm:cxn modelId="{8145A600-D984-44F4-810A-9D78DF997B11}" srcId="{AD218CB3-1A69-4E47-AD75-2E465EA9CB64}" destId="{45490CCA-8F70-42B6-B540-3D8A6936C741}" srcOrd="0" destOrd="0" parTransId="{09456824-2C5F-44E2-937A-6004280FD57B}" sibTransId="{6A325E73-E2DD-4679-B4D6-0D6E30011547}"/>
+    <dgm:cxn modelId="{8145A600-D984-44F4-810A-9D78DF997B11}" srcId="{5E6A7165-3B20-4EDC-A1CF-DECE644A4E80}" destId="{45490CCA-8F70-42B6-B540-3D8A6936C741}" srcOrd="1" destOrd="0" parTransId="{09456824-2C5F-44E2-937A-6004280FD57B}" sibTransId="{6A325E73-E2DD-4679-B4D6-0D6E30011547}"/>
     <dgm:cxn modelId="{2911570B-8E76-442D-8C48-CEFD1AB6AF12}" srcId="{4A2591FC-2151-4E21-BCD1-C048CF813E2D}" destId="{BD2F0842-E721-48F2-A2A2-4764AD9EBCC1}" srcOrd="0" destOrd="0" parTransId="{FB5F6BD4-9CD3-448B-820D-F05E07104C15}" sibTransId="{0E054C6C-574E-4206-A4C4-9B6CA76C903A}"/>
-    <dgm:cxn modelId="{E2927812-F9ED-4AA3-A028-70D59B1983C0}" type="presOf" srcId="{45490CCA-8F70-42B6-B540-3D8A6936C741}" destId="{952258F3-7A3E-439D-A889-C893A783FC7F}" srcOrd="0" destOrd="0" presId="urn:microsoft.com/office/officeart/2009/3/layout/HorizontalOrganizationChart"/>
     <dgm:cxn modelId="{B6FF6B16-2A06-4A32-BB21-6258B8D09312}" type="presOf" srcId="{CB6537DD-E1F8-46A8-B5B9-41A732E6F5C9}" destId="{DA23D161-A42E-43F8-B9C3-B29598F0605D}" srcOrd="0" destOrd="0" presId="urn:microsoft.com/office/officeart/2009/3/layout/HorizontalOrganizationChart"/>
     <dgm:cxn modelId="{869A601F-755A-413B-B079-1060B5D9C698}" type="presOf" srcId="{5E6A7165-3B20-4EDC-A1CF-DECE644A4E80}" destId="{9B140528-1195-40A0-999B-8041A8CEED55}" srcOrd="0" destOrd="0" presId="urn:microsoft.com/office/officeart/2009/3/layout/HorizontalOrganizationChart"/>
     <dgm:cxn modelId="{FF65452E-AA57-4C21-B895-62436BF89339}" type="presOf" srcId="{E13AC13E-F23F-4B96-BBD0-BAC7C17F321B}" destId="{AB12C268-67EE-4FDF-A87A-0E273608076B}" srcOrd="0" destOrd="0" presId="urn:microsoft.com/office/officeart/2009/3/layout/HorizontalOrganizationChart"/>
@@ -3516,30 +3587,36 @@
     <dgm:cxn modelId="{D90D653F-0DB6-4CD0-858A-7878EFBFA015}" srcId="{77D7FEBA-ECA9-46FA-98EC-D4C23FFFA083}" destId="{7AE60BE0-9E4C-4F95-BD0B-97233CE80452}" srcOrd="1" destOrd="0" parTransId="{78B2311B-DF33-49DD-BE8C-7F37E04D510F}" sibTransId="{505BA5E6-DABF-42DA-93DB-E4782D08E8E8}"/>
     <dgm:cxn modelId="{7996EF3F-300E-46C3-81D5-67EC613D84A8}" type="presOf" srcId="{FB5F6BD4-9CD3-448B-820D-F05E07104C15}" destId="{80DA631E-F6A5-4F07-AE9B-81CEDDCE75D2}" srcOrd="0" destOrd="0" presId="urn:microsoft.com/office/officeart/2009/3/layout/HorizontalOrganizationChart"/>
     <dgm:cxn modelId="{8004B160-931B-4E66-BA2C-2CFAAE8207EC}" type="presOf" srcId="{4A2591FC-2151-4E21-BCD1-C048CF813E2D}" destId="{880299AB-EAF8-40FE-8D2B-82EBF3261907}" srcOrd="1" destOrd="0" presId="urn:microsoft.com/office/officeart/2009/3/layout/HorizontalOrganizationChart"/>
-    <dgm:cxn modelId="{C7181C62-704A-450E-9072-C80DC8978F7D}" type="presOf" srcId="{ECC8D15F-9ED1-4325-B95E-8D7C579B63EE}" destId="{F64C9670-F9D3-4B2E-950B-F708FDA3711F}" srcOrd="0" destOrd="0" presId="urn:microsoft.com/office/officeart/2009/3/layout/HorizontalOrganizationChart"/>
+    <dgm:cxn modelId="{7B463C41-90CD-4427-BF17-ECE70A554C4D}" type="presOf" srcId="{93206431-A577-4A65-8D7B-886AE0B9F00F}" destId="{CCA0430B-342D-4BF5-9448-2D0B17D3AAC2}" srcOrd="1" destOrd="0" presId="urn:microsoft.com/office/officeart/2009/3/layout/HorizontalOrganizationChart"/>
     <dgm:cxn modelId="{03F68062-487A-4665-84EB-A5A954B65A5B}" type="presOf" srcId="{BD2F0842-E721-48F2-A2A2-4764AD9EBCC1}" destId="{C9609E3C-6E47-4013-9A14-440FE5BEB813}" srcOrd="0" destOrd="0" presId="urn:microsoft.com/office/officeart/2009/3/layout/HorizontalOrganizationChart"/>
+    <dgm:cxn modelId="{71AF9862-39C8-43FA-91B6-566DEE1B290E}" type="presOf" srcId="{93206431-A577-4A65-8D7B-886AE0B9F00F}" destId="{5DF909A4-D1DD-4AAF-BFEC-DC2028097CB7}" srcOrd="0" destOrd="0" presId="urn:microsoft.com/office/officeart/2009/3/layout/HorizontalOrganizationChart"/>
     <dgm:cxn modelId="{A658B763-54A4-41BE-BC7A-E5E40B253E2A}" type="presOf" srcId="{BCBDC622-9CE8-4210-8EFF-A70F025E6AD4}" destId="{A64E1426-4CDA-4411-88AB-8E292DC7D6D9}" srcOrd="0" destOrd="0" presId="urn:microsoft.com/office/officeart/2009/3/layout/HorizontalOrganizationChart"/>
     <dgm:cxn modelId="{40B9EA43-22C6-4C4A-B5A3-F0BFE3CF3FF9}" srcId="{ECC691AC-31CA-4BAA-88A5-969AD18731A8}" destId="{4A2591FC-2151-4E21-BCD1-C048CF813E2D}" srcOrd="0" destOrd="0" parTransId="{0DF63A78-16FA-4B9D-969B-6BBE815D8120}" sibTransId="{D1A4243E-6242-4203-BA5A-1130D709ECE9}"/>
     <dgm:cxn modelId="{BA49C765-DFA6-4D49-8BC0-C513B740DBFD}" srcId="{BD2F0842-E721-48F2-A2A2-4764AD9EBCC1}" destId="{E13AC13E-F23F-4B96-BBD0-BAC7C17F321B}" srcOrd="0" destOrd="0" parTransId="{A6B01058-23B1-4275-8252-D15DA5DF77CB}" sibTransId="{84E7F711-2613-4B56-839D-882348A7E6BB}"/>
+    <dgm:cxn modelId="{E94BE867-EE01-4488-A06C-E29E1634FAB7}" type="presOf" srcId="{09456824-2C5F-44E2-937A-6004280FD57B}" destId="{A98802D8-3CB8-483C-9395-C0AABC947EDF}" srcOrd="0" destOrd="0" presId="urn:microsoft.com/office/officeart/2009/3/layout/HorizontalOrganizationChart"/>
     <dgm:cxn modelId="{DDB8F647-3F43-45F6-B484-799D19DAC192}" type="presOf" srcId="{C301587A-1BFD-486B-B31D-E085AAC479B3}" destId="{B7BBE519-12FE-4DAF-AED2-140F229A3BF2}" srcOrd="0" destOrd="0" presId="urn:microsoft.com/office/officeart/2009/3/layout/HorizontalOrganizationChart"/>
+    <dgm:cxn modelId="{F9DC5168-95DC-424C-B650-D3EEF9B1F732}" type="presOf" srcId="{45490CCA-8F70-42B6-B540-3D8A6936C741}" destId="{952258F3-7A3E-439D-A889-C893A783FC7F}" srcOrd="0" destOrd="0" presId="urn:microsoft.com/office/officeart/2009/3/layout/HorizontalOrganizationChart"/>
+    <dgm:cxn modelId="{A8F2614C-CFAD-45BE-9C14-FA6FA5B684F3}" type="presOf" srcId="{45490CCA-8F70-42B6-B540-3D8A6936C741}" destId="{30A755E2-7B97-4AB1-B46B-E8EE4FED09FD}" srcOrd="1" destOrd="0" presId="urn:microsoft.com/office/officeart/2009/3/layout/HorizontalOrganizationChart"/>
     <dgm:cxn modelId="{ABA97250-7A09-48F1-A2B9-643CA0DF0488}" type="presOf" srcId="{4A2591FC-2151-4E21-BCD1-C048CF813E2D}" destId="{F0D4D58E-D126-4E97-87E3-9435AA748E19}" srcOrd="0" destOrd="0" presId="urn:microsoft.com/office/officeart/2009/3/layout/HorizontalOrganizationChart"/>
-    <dgm:cxn modelId="{6A6FDA71-CD5E-479A-B76F-2B1B9249F10A}" srcId="{77D7FEBA-ECA9-46FA-98EC-D4C23FFFA083}" destId="{ECC8D15F-9ED1-4325-B95E-8D7C579B63EE}" srcOrd="3" destOrd="0" parTransId="{EEA5A19C-28D1-401E-9728-006490C78CF1}" sibTransId="{0C021CE0-1580-4590-B113-FFF5A36455E5}"/>
     <dgm:cxn modelId="{B09F3C59-9184-449B-9710-AF7DD662A8E8}" type="presOf" srcId="{F207E862-2444-4F4E-8112-1C209C0C6E0D}" destId="{DD868811-05F1-475D-955C-E855ECF648A5}" srcOrd="0" destOrd="0" presId="urn:microsoft.com/office/officeart/2009/3/layout/HorizontalOrganizationChart"/>
-    <dgm:cxn modelId="{BBF7A45A-CE2D-4AEB-9ADC-2FBA3754B4B7}" type="presOf" srcId="{09456824-2C5F-44E2-937A-6004280FD57B}" destId="{A98802D8-3CB8-483C-9395-C0AABC947EDF}" srcOrd="0" destOrd="0" presId="urn:microsoft.com/office/officeart/2009/3/layout/HorizontalOrganizationChart"/>
     <dgm:cxn modelId="{3579467B-684B-4C1C-B88B-31AF62FBEA95}" srcId="{4A2591FC-2151-4E21-BCD1-C048CF813E2D}" destId="{77D7FEBA-ECA9-46FA-98EC-D4C23FFFA083}" srcOrd="3" destOrd="0" parTransId="{C301587A-1BFD-486B-B31D-E085AAC479B3}" sibTransId="{89CBF129-C474-4825-9E32-318991B67934}"/>
-    <dgm:cxn modelId="{8804087E-1F51-4801-94BA-1771C298EE19}" type="presOf" srcId="{ECC8D15F-9ED1-4325-B95E-8D7C579B63EE}" destId="{63AC51AD-5405-4C3C-BB58-ECD43DD9BC74}" srcOrd="1" destOrd="0" presId="urn:microsoft.com/office/officeart/2009/3/layout/HorizontalOrganizationChart"/>
     <dgm:cxn modelId="{6266A188-12EF-4DE3-B87B-2DD6F8A4B9B1}" type="presOf" srcId="{ECC691AC-31CA-4BAA-88A5-969AD18731A8}" destId="{98427039-18B8-4418-BC76-048FA6D489B3}" srcOrd="0" destOrd="0" presId="urn:microsoft.com/office/officeart/2009/3/layout/HorizontalOrganizationChart"/>
     <dgm:cxn modelId="{6975E68D-5B20-49D3-ABD7-52A1B638D7F4}" type="presOf" srcId="{77D7FEBA-ECA9-46FA-98EC-D4C23FFFA083}" destId="{E2334194-CB5A-4D3E-BCDA-B5E1A72330A5}" srcOrd="1" destOrd="0" presId="urn:microsoft.com/office/officeart/2009/3/layout/HorizontalOrganizationChart"/>
     <dgm:cxn modelId="{F588F88F-E3DF-453F-8DF1-61EECEB41AEF}" type="presOf" srcId="{0CE66462-EBC6-4B26-9E25-1916F40C52B0}" destId="{478FA14F-17B9-4C3C-B3CD-A9A00FD127CD}" srcOrd="0" destOrd="0" presId="urn:microsoft.com/office/officeart/2009/3/layout/HorizontalOrganizationChart"/>
     <dgm:cxn modelId="{29780291-576D-4770-A277-68E48F778474}" type="presOf" srcId="{73B933D3-F340-4A09-8414-1A4F24F833BC}" destId="{538A3C8B-4526-4CDA-BE38-92D4C6E63CDF}" srcOrd="1" destOrd="0" presId="urn:microsoft.com/office/officeart/2009/3/layout/HorizontalOrganizationChart"/>
+    <dgm:cxn modelId="{7054A196-C19D-4485-B8A4-AE7527DAAB41}" type="presOf" srcId="{D4B1C904-82C9-4D9E-931D-0B91E599EE1F}" destId="{22E1D864-F655-44C9-A45B-3E8E447AF08F}" srcOrd="0" destOrd="0" presId="urn:microsoft.com/office/officeart/2009/3/layout/HorizontalOrganizationChart"/>
+    <dgm:cxn modelId="{411A489A-9A69-41AB-849F-BF8D66BEA29B}" srcId="{77D7FEBA-ECA9-46FA-98EC-D4C23FFFA083}" destId="{93206431-A577-4A65-8D7B-886AE0B9F00F}" srcOrd="3" destOrd="0" parTransId="{CD948D6D-722D-4E96-B8AB-6784745B333E}" sibTransId="{D0662E1B-C68C-449C-A568-35F4AF831264}"/>
     <dgm:cxn modelId="{D429A39D-E54B-41D7-AD73-C289849E60CE}" type="presOf" srcId="{7AE60BE0-9E4C-4F95-BD0B-97233CE80452}" destId="{DBE83B29-5E1E-467E-A745-7B27708AFD8C}" srcOrd="0" destOrd="0" presId="urn:microsoft.com/office/officeart/2009/3/layout/HorizontalOrganizationChart"/>
     <dgm:cxn modelId="{BAC3D8A0-CBC3-48DA-AE1E-740B28472B7B}" type="presOf" srcId="{AD218CB3-1A69-4E47-AD75-2E465EA9CB64}" destId="{76FDB8A8-5717-4B96-9798-3FFEDEEE5403}" srcOrd="1" destOrd="0" presId="urn:microsoft.com/office/officeart/2009/3/layout/HorizontalOrganizationChart"/>
     <dgm:cxn modelId="{308556A5-22DA-470C-BB3B-CECC857E90A0}" srcId="{4A2591FC-2151-4E21-BCD1-C048CF813E2D}" destId="{5E6A7165-3B20-4EDC-A1CF-DECE644A4E80}" srcOrd="1" destOrd="0" parTransId="{2D8F137C-4B0C-4A99-A177-D56C60AB8D98}" sibTransId="{FDBA0632-92A1-4EF8-9DA2-FDBAA6418EAB}"/>
+    <dgm:cxn modelId="{F28DA8A5-E74C-42D8-BCB0-2F81CE3BA0EA}" type="presOf" srcId="{CD948D6D-722D-4E96-B8AB-6784745B333E}" destId="{E7D06081-E8B9-4481-A220-83A839937B9C}" srcOrd="0" destOrd="0" presId="urn:microsoft.com/office/officeart/2009/3/layout/HorizontalOrganizationChart"/>
     <dgm:cxn modelId="{D738B2AB-06D2-45BA-B458-57BA73EB4F9C}" srcId="{77D7FEBA-ECA9-46FA-98EC-D4C23FFFA083}" destId="{17B473CC-5604-4D29-B52A-3FB265F41F0F}" srcOrd="0" destOrd="0" parTransId="{F207E862-2444-4F4E-8112-1C209C0C6E0D}" sibTransId="{78F182B0-BA22-48F7-B49E-0065E7C5F9D9}"/>
     <dgm:cxn modelId="{A37B52B3-886B-4145-BFA1-CAA099445698}" type="presOf" srcId="{AD218CB3-1A69-4E47-AD75-2E465EA9CB64}" destId="{BC9CBE9A-F4A2-4A21-9D53-4EC382D0FEDD}" srcOrd="0" destOrd="0" presId="urn:microsoft.com/office/officeart/2009/3/layout/HorizontalOrganizationChart"/>
     <dgm:cxn modelId="{7CAA09B5-0CBF-4C86-A8CC-734D63A49B80}" srcId="{BD2F0842-E721-48F2-A2A2-4764AD9EBCC1}" destId="{73B933D3-F340-4A09-8414-1A4F24F833BC}" srcOrd="1" destOrd="0" parTransId="{3B4951CB-194C-4200-91E3-C60187B48B60}" sibTransId="{FD485C9B-BB80-476C-82BC-5161FE886F3C}"/>
     <dgm:cxn modelId="{9DD8F5B8-690E-4797-BA4E-7AFF6BC17A75}" type="presOf" srcId="{BD2F0842-E721-48F2-A2A2-4764AD9EBCC1}" destId="{E737C0D4-8D7D-4591-906C-C5717A9BAC70}" srcOrd="1" destOrd="0" presId="urn:microsoft.com/office/officeart/2009/3/layout/HorizontalOrganizationChart"/>
     <dgm:cxn modelId="{9DB6A1BA-1155-41B1-BC93-707760F5D2DA}" type="presOf" srcId="{E13AC13E-F23F-4B96-BBD0-BAC7C17F321B}" destId="{33CA2607-B3AD-4AF6-9C83-6BDD01967ADB}" srcOrd="1" destOrd="0" presId="urn:microsoft.com/office/officeart/2009/3/layout/HorizontalOrganizationChart"/>
+    <dgm:cxn modelId="{9DE32ABC-9764-42F1-AC1A-99816AECC3B5}" srcId="{77D7FEBA-ECA9-46FA-98EC-D4C23FFFA083}" destId="{80CA23FE-A49A-4E7F-A225-B06A43FFA962}" srcOrd="4" destOrd="0" parTransId="{D4B1C904-82C9-4D9E-931D-0B91E599EE1F}" sibTransId="{5868BB1B-D91C-4151-8E81-BB79DFEF52F3}"/>
+    <dgm:cxn modelId="{AD666BC2-B453-463F-AACA-9C1DE2C2C610}" type="presOf" srcId="{80CA23FE-A49A-4E7F-A225-B06A43FFA962}" destId="{72D08835-297A-4D3F-AFF0-01081D88A8DD}" srcOrd="0" destOrd="0" presId="urn:microsoft.com/office/officeart/2009/3/layout/HorizontalOrganizationChart"/>
     <dgm:cxn modelId="{5A64B3C2-8DC6-4B3B-AFEC-A330B419A61A}" type="presOf" srcId="{17B473CC-5604-4D29-B52A-3FB265F41F0F}" destId="{1C7A1B66-F15E-4515-AC2F-BBC49BD17F69}" srcOrd="1" destOrd="0" presId="urn:microsoft.com/office/officeart/2009/3/layout/HorizontalOrganizationChart"/>
     <dgm:cxn modelId="{4F700AC5-AF39-4BB5-A395-A3DE2AFF3538}" type="presOf" srcId="{3B4951CB-194C-4200-91E3-C60187B48B60}" destId="{85207240-C0E6-41FE-9FCA-002B8013F185}" srcOrd="0" destOrd="0" presId="urn:microsoft.com/office/officeart/2009/3/layout/HorizontalOrganizationChart"/>
     <dgm:cxn modelId="{FB54BFC8-761B-4CE0-875E-2F1674727E6A}" type="presOf" srcId="{77D7FEBA-ECA9-46FA-98EC-D4C23FFFA083}" destId="{3AE5A43E-07B9-4637-95D2-B27F2399A626}" srcOrd="0" destOrd="0" presId="urn:microsoft.com/office/officeart/2009/3/layout/HorizontalOrganizationChart"/>
@@ -3548,9 +3625,8 @@
     <dgm:cxn modelId="{A83FA3D0-1519-468A-A9BD-BD62B44D914D}" type="presOf" srcId="{7AE60BE0-9E4C-4F95-BD0B-97233CE80452}" destId="{182267B8-763E-42E3-802D-C4258D9EA806}" srcOrd="1" destOrd="0" presId="urn:microsoft.com/office/officeart/2009/3/layout/HorizontalOrganizationChart"/>
     <dgm:cxn modelId="{4614B5D0-9A17-4F7D-97D9-B82B15FEDF4B}" type="presOf" srcId="{17B473CC-5604-4D29-B52A-3FB265F41F0F}" destId="{BA2A8497-6940-4B72-878A-0D81DFD00DF7}" srcOrd="0" destOrd="0" presId="urn:microsoft.com/office/officeart/2009/3/layout/HorizontalOrganizationChart"/>
     <dgm:cxn modelId="{E64CC8D4-B27D-4D6A-90DE-CC15D76B37B2}" srcId="{4A2591FC-2151-4E21-BCD1-C048CF813E2D}" destId="{B5989953-7F94-4BCC-8F21-2B87D0CC7209}" srcOrd="2" destOrd="0" parTransId="{BCBDC622-9CE8-4210-8EFF-A70F025E6AD4}" sibTransId="{43862192-2129-45DF-988C-390A1F1581FA}"/>
+    <dgm:cxn modelId="{89F0D4E2-F514-40CB-95C0-0341BB717581}" type="presOf" srcId="{80CA23FE-A49A-4E7F-A225-B06A43FFA962}" destId="{388EA3A7-10E7-499F-97AD-8A7A6FBF9901}" srcOrd="1" destOrd="0" presId="urn:microsoft.com/office/officeart/2009/3/layout/HorizontalOrganizationChart"/>
     <dgm:cxn modelId="{B9E102E7-1F71-47EE-AAAD-E819D9352B63}" type="presOf" srcId="{0CE66462-EBC6-4B26-9E25-1916F40C52B0}" destId="{3F4DC0F8-45EF-4B63-869E-499BBA13C581}" srcOrd="1" destOrd="0" presId="urn:microsoft.com/office/officeart/2009/3/layout/HorizontalOrganizationChart"/>
-    <dgm:cxn modelId="{4379B4E7-1EF2-44BA-B770-ED4E717A6163}" type="presOf" srcId="{45490CCA-8F70-42B6-B540-3D8A6936C741}" destId="{30A755E2-7B97-4AB1-B46B-E8EE4FED09FD}" srcOrd="1" destOrd="0" presId="urn:microsoft.com/office/officeart/2009/3/layout/HorizontalOrganizationChart"/>
-    <dgm:cxn modelId="{9E567DEC-D4A3-48F6-9588-4241D21E9501}" type="presOf" srcId="{EEA5A19C-28D1-401E-9728-006490C78CF1}" destId="{76F5343C-832C-4902-9DD1-019DF4ADE6F3}" srcOrd="0" destOrd="0" presId="urn:microsoft.com/office/officeart/2009/3/layout/HorizontalOrganizationChart"/>
     <dgm:cxn modelId="{3C32A3F9-638E-4C05-9E5A-25E92A6E79B6}" type="presOf" srcId="{5E6A7165-3B20-4EDC-A1CF-DECE644A4E80}" destId="{F9780C70-0F47-4D52-B66F-6955337B0A2C}" srcOrd="1" destOrd="0" presId="urn:microsoft.com/office/officeart/2009/3/layout/HorizontalOrganizationChart"/>
     <dgm:cxn modelId="{5B23AE42-3239-417E-BDA2-719F662F14C9}" type="presParOf" srcId="{98427039-18B8-4418-BC76-048FA6D489B3}" destId="{7289576A-3175-4811-A760-572D25BDC503}" srcOrd="0" destOrd="0" presId="urn:microsoft.com/office/officeart/2009/3/layout/HorizontalOrganizationChart"/>
     <dgm:cxn modelId="{14319C79-DDED-4D7C-946B-751AE46A2D2A}" type="presParOf" srcId="{7289576A-3175-4811-A760-572D25BDC503}" destId="{4D9A18FA-CCC9-4832-BE2F-2B062CF6DACA}" srcOrd="0" destOrd="0" presId="urn:microsoft.com/office/officeart/2009/3/layout/HorizontalOrganizationChart"/>
@@ -3590,14 +3666,14 @@
     <dgm:cxn modelId="{B7430D8E-88B6-4560-9DCA-A168366BB60B}" type="presParOf" srcId="{77B5830A-07AD-4261-84D7-1EF204D6F505}" destId="{BC9CBE9A-F4A2-4A21-9D53-4EC382D0FEDD}" srcOrd="0" destOrd="0" presId="urn:microsoft.com/office/officeart/2009/3/layout/HorizontalOrganizationChart"/>
     <dgm:cxn modelId="{1B2632AD-8500-4DB7-898B-38A406408DA8}" type="presParOf" srcId="{77B5830A-07AD-4261-84D7-1EF204D6F505}" destId="{76FDB8A8-5717-4B96-9798-3FFEDEEE5403}" srcOrd="1" destOrd="0" presId="urn:microsoft.com/office/officeart/2009/3/layout/HorizontalOrganizationChart"/>
     <dgm:cxn modelId="{90687E07-EF06-4167-BACD-7BAA255DAD08}" type="presParOf" srcId="{5CCB4162-F295-4172-895F-E640F4D8EDF1}" destId="{FF8BBFCC-2544-4A03-91BB-1BAE6873A701}" srcOrd="1" destOrd="0" presId="urn:microsoft.com/office/officeart/2009/3/layout/HorizontalOrganizationChart"/>
-    <dgm:cxn modelId="{D9B2398A-927F-4BAD-ADD0-588E73CDBEC2}" type="presParOf" srcId="{FF8BBFCC-2544-4A03-91BB-1BAE6873A701}" destId="{A98802D8-3CB8-483C-9395-C0AABC947EDF}" srcOrd="0" destOrd="0" presId="urn:microsoft.com/office/officeart/2009/3/layout/HorizontalOrganizationChart"/>
-    <dgm:cxn modelId="{5C880EAB-3762-4AFC-AB60-7C7CBF240B5A}" type="presParOf" srcId="{FF8BBFCC-2544-4A03-91BB-1BAE6873A701}" destId="{C00272D7-B963-43F3-A304-A5ABF9CB085D}" srcOrd="1" destOrd="0" presId="urn:microsoft.com/office/officeart/2009/3/layout/HorizontalOrganizationChart"/>
-    <dgm:cxn modelId="{B6C95736-30FB-4A58-A81B-173649276632}" type="presParOf" srcId="{C00272D7-B963-43F3-A304-A5ABF9CB085D}" destId="{94CFC44D-4160-4A2E-B17C-D367FFDBAA47}" srcOrd="0" destOrd="0" presId="urn:microsoft.com/office/officeart/2009/3/layout/HorizontalOrganizationChart"/>
-    <dgm:cxn modelId="{F1D39C83-3F68-4EA6-9C07-BC4D1AF42AE5}" type="presParOf" srcId="{94CFC44D-4160-4A2E-B17C-D367FFDBAA47}" destId="{952258F3-7A3E-439D-A889-C893A783FC7F}" srcOrd="0" destOrd="0" presId="urn:microsoft.com/office/officeart/2009/3/layout/HorizontalOrganizationChart"/>
-    <dgm:cxn modelId="{4787D05A-F43B-411C-ACF1-BE522D5DC337}" type="presParOf" srcId="{94CFC44D-4160-4A2E-B17C-D367FFDBAA47}" destId="{30A755E2-7B97-4AB1-B46B-E8EE4FED09FD}" srcOrd="1" destOrd="0" presId="urn:microsoft.com/office/officeart/2009/3/layout/HorizontalOrganizationChart"/>
-    <dgm:cxn modelId="{678F972F-5B6E-4730-ABC2-939FAB1125FD}" type="presParOf" srcId="{C00272D7-B963-43F3-A304-A5ABF9CB085D}" destId="{165AB3CC-0481-4742-9DDA-26FB376A2F87}" srcOrd="1" destOrd="0" presId="urn:microsoft.com/office/officeart/2009/3/layout/HorizontalOrganizationChart"/>
-    <dgm:cxn modelId="{B7E6F0A3-55B6-41E1-BA48-9E230CD42794}" type="presParOf" srcId="{C00272D7-B963-43F3-A304-A5ABF9CB085D}" destId="{D51497DA-E14D-4E00-B256-45CA594E4800}" srcOrd="2" destOrd="0" presId="urn:microsoft.com/office/officeart/2009/3/layout/HorizontalOrganizationChart"/>
     <dgm:cxn modelId="{49C5E344-5C53-46EB-9A1E-6B7E101C4188}" type="presParOf" srcId="{5CCB4162-F295-4172-895F-E640F4D8EDF1}" destId="{4D8EA0AF-27C3-4232-9B31-78D13993AE3C}" srcOrd="2" destOrd="0" presId="urn:microsoft.com/office/officeart/2009/3/layout/HorizontalOrganizationChart"/>
+    <dgm:cxn modelId="{08C35929-4F4A-452A-AE8B-9B3B63EF00EF}" type="presParOf" srcId="{F9B239E9-1ADD-41E9-A4DE-EDE6C1E11934}" destId="{A98802D8-3CB8-483C-9395-C0AABC947EDF}" srcOrd="2" destOrd="0" presId="urn:microsoft.com/office/officeart/2009/3/layout/HorizontalOrganizationChart"/>
+    <dgm:cxn modelId="{5D37C505-6CDA-4DC3-AD21-0A8BA7FC7610}" type="presParOf" srcId="{F9B239E9-1ADD-41E9-A4DE-EDE6C1E11934}" destId="{C00272D7-B963-43F3-A304-A5ABF9CB085D}" srcOrd="3" destOrd="0" presId="urn:microsoft.com/office/officeart/2009/3/layout/HorizontalOrganizationChart"/>
+    <dgm:cxn modelId="{5B09C41F-2DDE-4995-BAB7-7C91DF915E87}" type="presParOf" srcId="{C00272D7-B963-43F3-A304-A5ABF9CB085D}" destId="{94CFC44D-4160-4A2E-B17C-D367FFDBAA47}" srcOrd="0" destOrd="0" presId="urn:microsoft.com/office/officeart/2009/3/layout/HorizontalOrganizationChart"/>
+    <dgm:cxn modelId="{ACEA6F7C-A155-49B8-86C5-90C73233BA62}" type="presParOf" srcId="{94CFC44D-4160-4A2E-B17C-D367FFDBAA47}" destId="{952258F3-7A3E-439D-A889-C893A783FC7F}" srcOrd="0" destOrd="0" presId="urn:microsoft.com/office/officeart/2009/3/layout/HorizontalOrganizationChart"/>
+    <dgm:cxn modelId="{A23A7B31-D8CB-4C5C-8E89-84363A021BAF}" type="presParOf" srcId="{94CFC44D-4160-4A2E-B17C-D367FFDBAA47}" destId="{30A755E2-7B97-4AB1-B46B-E8EE4FED09FD}" srcOrd="1" destOrd="0" presId="urn:microsoft.com/office/officeart/2009/3/layout/HorizontalOrganizationChart"/>
+    <dgm:cxn modelId="{6DAF676A-3277-410F-BFD8-DF288B5B6450}" type="presParOf" srcId="{C00272D7-B963-43F3-A304-A5ABF9CB085D}" destId="{165AB3CC-0481-4742-9DDA-26FB376A2F87}" srcOrd="1" destOrd="0" presId="urn:microsoft.com/office/officeart/2009/3/layout/HorizontalOrganizationChart"/>
+    <dgm:cxn modelId="{437C90EF-34C9-4D37-B365-9CF6333DC557}" type="presParOf" srcId="{C00272D7-B963-43F3-A304-A5ABF9CB085D}" destId="{D51497DA-E14D-4E00-B256-45CA594E4800}" srcOrd="2" destOrd="0" presId="urn:microsoft.com/office/officeart/2009/3/layout/HorizontalOrganizationChart"/>
     <dgm:cxn modelId="{86B87660-85E1-4647-9034-B7509188B078}" type="presParOf" srcId="{333B485B-5D51-4E17-985C-1FFB1524BF32}" destId="{27B471F1-F27B-40D3-AF18-5D64EFE6DA10}" srcOrd="2" destOrd="0" presId="urn:microsoft.com/office/officeart/2009/3/layout/HorizontalOrganizationChart"/>
     <dgm:cxn modelId="{985D05AA-AC21-40E2-8EE9-C06FF5E4A172}" type="presParOf" srcId="{2A2BDB67-0DE0-42F3-BF27-72979D1E818B}" destId="{A64E1426-4CDA-4411-88AB-8E292DC7D6D9}" srcOrd="4" destOrd="0" presId="urn:microsoft.com/office/officeart/2009/3/layout/HorizontalOrganizationChart"/>
     <dgm:cxn modelId="{BE2DC1FF-15EC-40B5-A862-8096CC4AF26A}" type="presParOf" srcId="{2A2BDB67-0DE0-42F3-BF27-72979D1E818B}" destId="{2EF11E54-8447-4CD6-906E-E5B5494DC69B}" srcOrd="5" destOrd="0" presId="urn:microsoft.com/office/officeart/2009/3/layout/HorizontalOrganizationChart"/>
@@ -3633,13 +3709,20 @@
     <dgm:cxn modelId="{1FAA4DC5-57A9-4813-B1C9-C30249601755}" type="presParOf" srcId="{FA28A72F-DD17-4525-B33F-FB74DBE5CE5F}" destId="{3F4DC0F8-45EF-4B63-869E-499BBA13C581}" srcOrd="1" destOrd="0" presId="urn:microsoft.com/office/officeart/2009/3/layout/HorizontalOrganizationChart"/>
     <dgm:cxn modelId="{447BABCB-FCEC-4768-B49E-68840B392040}" type="presParOf" srcId="{862790A9-C84A-4D0F-9992-4FAEED445928}" destId="{6C765052-465B-4319-ABC1-EFAB53BBBDD9}" srcOrd="1" destOrd="0" presId="urn:microsoft.com/office/officeart/2009/3/layout/HorizontalOrganizationChart"/>
     <dgm:cxn modelId="{D75BA36B-D3AF-4508-86AD-994C80D96275}" type="presParOf" srcId="{862790A9-C84A-4D0F-9992-4FAEED445928}" destId="{219DEE87-C294-4C24-9868-66B047523BF4}" srcOrd="2" destOrd="0" presId="urn:microsoft.com/office/officeart/2009/3/layout/HorizontalOrganizationChart"/>
-    <dgm:cxn modelId="{1F4E8F36-255B-4C9E-8163-282A583DE3BC}" type="presParOf" srcId="{38F52BE6-26AA-488D-918F-F2E773EE41F0}" destId="{76F5343C-832C-4902-9DD1-019DF4ADE6F3}" srcOrd="6" destOrd="0" presId="urn:microsoft.com/office/officeart/2009/3/layout/HorizontalOrganizationChart"/>
-    <dgm:cxn modelId="{0EAEE566-C04C-48F7-B7F8-12688F141C2B}" type="presParOf" srcId="{38F52BE6-26AA-488D-918F-F2E773EE41F0}" destId="{0ACD393B-0CC2-402B-8C12-6D9E7D8D81E1}" srcOrd="7" destOrd="0" presId="urn:microsoft.com/office/officeart/2009/3/layout/HorizontalOrganizationChart"/>
-    <dgm:cxn modelId="{A7C021D4-3517-4BA4-BFE5-1EC1F2EB8D5F}" type="presParOf" srcId="{0ACD393B-0CC2-402B-8C12-6D9E7D8D81E1}" destId="{46732A59-C195-4178-A9D8-8AACF2BF7F13}" srcOrd="0" destOrd="0" presId="urn:microsoft.com/office/officeart/2009/3/layout/HorizontalOrganizationChart"/>
-    <dgm:cxn modelId="{2CC498E2-E5B7-4E59-8415-374588B2EF25}" type="presParOf" srcId="{46732A59-C195-4178-A9D8-8AACF2BF7F13}" destId="{F64C9670-F9D3-4B2E-950B-F708FDA3711F}" srcOrd="0" destOrd="0" presId="urn:microsoft.com/office/officeart/2009/3/layout/HorizontalOrganizationChart"/>
-    <dgm:cxn modelId="{DF36155C-AB06-4206-91B8-FACEC556FBD5}" type="presParOf" srcId="{46732A59-C195-4178-A9D8-8AACF2BF7F13}" destId="{63AC51AD-5405-4C3C-BB58-ECD43DD9BC74}" srcOrd="1" destOrd="0" presId="urn:microsoft.com/office/officeart/2009/3/layout/HorizontalOrganizationChart"/>
-    <dgm:cxn modelId="{6152C49E-0B91-4775-AA6D-3E4948C0739D}" type="presParOf" srcId="{0ACD393B-0CC2-402B-8C12-6D9E7D8D81E1}" destId="{39E75698-0381-412D-9461-393EEF3EB8BD}" srcOrd="1" destOrd="0" presId="urn:microsoft.com/office/officeart/2009/3/layout/HorizontalOrganizationChart"/>
-    <dgm:cxn modelId="{F4FDFBB2-4CCD-4C69-BCC4-C594215BBC1E}" type="presParOf" srcId="{0ACD393B-0CC2-402B-8C12-6D9E7D8D81E1}" destId="{794E50D5-4EF2-4AD8-AD48-65C9C3A746DD}" srcOrd="2" destOrd="0" presId="urn:microsoft.com/office/officeart/2009/3/layout/HorizontalOrganizationChart"/>
+    <dgm:cxn modelId="{637A7384-683F-4E30-9612-1320D6CFF350}" type="presParOf" srcId="{38F52BE6-26AA-488D-918F-F2E773EE41F0}" destId="{E7D06081-E8B9-4481-A220-83A839937B9C}" srcOrd="6" destOrd="0" presId="urn:microsoft.com/office/officeart/2009/3/layout/HorizontalOrganizationChart"/>
+    <dgm:cxn modelId="{9006B8E0-A2C6-4417-B699-3FB116798595}" type="presParOf" srcId="{38F52BE6-26AA-488D-918F-F2E773EE41F0}" destId="{4715F000-CC26-4F87-A43D-CBB163D76D0A}" srcOrd="7" destOrd="0" presId="urn:microsoft.com/office/officeart/2009/3/layout/HorizontalOrganizationChart"/>
+    <dgm:cxn modelId="{FDDC1175-175C-49CB-8482-57A37D3D28F4}" type="presParOf" srcId="{4715F000-CC26-4F87-A43D-CBB163D76D0A}" destId="{71333ABA-AD11-423B-A4F9-1EE8E563A346}" srcOrd="0" destOrd="0" presId="urn:microsoft.com/office/officeart/2009/3/layout/HorizontalOrganizationChart"/>
+    <dgm:cxn modelId="{70D2FF63-8DF5-45BF-B10C-853367361645}" type="presParOf" srcId="{71333ABA-AD11-423B-A4F9-1EE8E563A346}" destId="{5DF909A4-D1DD-4AAF-BFEC-DC2028097CB7}" srcOrd="0" destOrd="0" presId="urn:microsoft.com/office/officeart/2009/3/layout/HorizontalOrganizationChart"/>
+    <dgm:cxn modelId="{736350BB-5CBD-4074-A9D0-6265511F7C09}" type="presParOf" srcId="{71333ABA-AD11-423B-A4F9-1EE8E563A346}" destId="{CCA0430B-342D-4BF5-9448-2D0B17D3AAC2}" srcOrd="1" destOrd="0" presId="urn:microsoft.com/office/officeart/2009/3/layout/HorizontalOrganizationChart"/>
+    <dgm:cxn modelId="{12F6AA21-1D98-4830-8702-7FF50C4E5AF9}" type="presParOf" srcId="{4715F000-CC26-4F87-A43D-CBB163D76D0A}" destId="{46F0A429-A68F-43BF-9F9E-BB70B51AC01F}" srcOrd="1" destOrd="0" presId="urn:microsoft.com/office/officeart/2009/3/layout/HorizontalOrganizationChart"/>
+    <dgm:cxn modelId="{0DFAA50E-FA15-4907-8479-118A945D486E}" type="presParOf" srcId="{4715F000-CC26-4F87-A43D-CBB163D76D0A}" destId="{BB87CF56-76EB-438F-8050-171648516A30}" srcOrd="2" destOrd="0" presId="urn:microsoft.com/office/officeart/2009/3/layout/HorizontalOrganizationChart"/>
+    <dgm:cxn modelId="{64611A74-91CE-4041-8D5D-041188492761}" type="presParOf" srcId="{38F52BE6-26AA-488D-918F-F2E773EE41F0}" destId="{22E1D864-F655-44C9-A45B-3E8E447AF08F}" srcOrd="8" destOrd="0" presId="urn:microsoft.com/office/officeart/2009/3/layout/HorizontalOrganizationChart"/>
+    <dgm:cxn modelId="{E19DF008-751F-4D62-B257-AE65FCE4722B}" type="presParOf" srcId="{38F52BE6-26AA-488D-918F-F2E773EE41F0}" destId="{6C62DFFE-455F-4CF7-8466-C9369135DB16}" srcOrd="9" destOrd="0" presId="urn:microsoft.com/office/officeart/2009/3/layout/HorizontalOrganizationChart"/>
+    <dgm:cxn modelId="{8057FD53-947A-4C4E-819B-58DDFF864E90}" type="presParOf" srcId="{6C62DFFE-455F-4CF7-8466-C9369135DB16}" destId="{88D2388B-5CA9-408F-9E87-EB115D4B181B}" srcOrd="0" destOrd="0" presId="urn:microsoft.com/office/officeart/2009/3/layout/HorizontalOrganizationChart"/>
+    <dgm:cxn modelId="{7DB86F2B-1DAF-4858-AC7B-D4C110A64BC0}" type="presParOf" srcId="{88D2388B-5CA9-408F-9E87-EB115D4B181B}" destId="{72D08835-297A-4D3F-AFF0-01081D88A8DD}" srcOrd="0" destOrd="0" presId="urn:microsoft.com/office/officeart/2009/3/layout/HorizontalOrganizationChart"/>
+    <dgm:cxn modelId="{A212E3DE-3AB5-489D-BCF7-B44E80D4CDAE}" type="presParOf" srcId="{88D2388B-5CA9-408F-9E87-EB115D4B181B}" destId="{388EA3A7-10E7-499F-97AD-8A7A6FBF9901}" srcOrd="1" destOrd="0" presId="urn:microsoft.com/office/officeart/2009/3/layout/HorizontalOrganizationChart"/>
+    <dgm:cxn modelId="{D4291A10-D84A-4BDB-A84A-C0E5207EBADE}" type="presParOf" srcId="{6C62DFFE-455F-4CF7-8466-C9369135DB16}" destId="{45510BA6-941A-4468-BC8A-FFDE5E16E0AA}" srcOrd="1" destOrd="0" presId="urn:microsoft.com/office/officeart/2009/3/layout/HorizontalOrganizationChart"/>
+    <dgm:cxn modelId="{DF37909A-BD27-4C3F-BB92-972469EC241A}" type="presParOf" srcId="{6C62DFFE-455F-4CF7-8466-C9369135DB16}" destId="{0445EBD1-EBF9-4E56-AC42-D0DE9AADB4F4}" srcOrd="2" destOrd="0" presId="urn:microsoft.com/office/officeart/2009/3/layout/HorizontalOrganizationChart"/>
     <dgm:cxn modelId="{015F8C2A-E0BF-48EF-A821-8FA76EEEA5B5}" type="presParOf" srcId="{3E256EEA-5780-4661-A5C7-F9823EC0EC45}" destId="{E9B3C465-88D3-4FFD-9FE5-E60412F6D603}" srcOrd="2" destOrd="0" presId="urn:microsoft.com/office/officeart/2009/3/layout/HorizontalOrganizationChart"/>
     <dgm:cxn modelId="{7FF2D14E-A86D-4182-BA5E-B59AFF10A2D3}" type="presParOf" srcId="{7289576A-3175-4811-A760-572D25BDC503}" destId="{4E2EADF7-D476-43E4-9F16-D587F33DABAC}" srcOrd="2" destOrd="0" presId="urn:microsoft.com/office/officeart/2009/3/layout/HorizontalOrganizationChart"/>
   </dgm:cxnLst>
@@ -4371,15 +4454,15 @@
       <dsp:cNvGrpSpPr/>
     </dsp:nvGrpSpPr>
     <dsp:grpSpPr/>
-    <dsp:sp modelId="{76F5343C-832C-4902-9DD1-019DF4ADE6F3}">
+    <dsp:sp modelId="{22E1D864-F655-44C9-A45B-3E8E447AF08F}">
       <dsp:nvSpPr>
         <dsp:cNvPr id="0" name=""/>
         <dsp:cNvSpPr/>
       </dsp:nvSpPr>
       <dsp:spPr>
         <a:xfrm>
-          <a:off x="3860581" y="5571895"/>
-          <a:ext cx="350782" cy="1131274"/>
+          <a:off x="4019601" y="4999335"/>
+          <a:ext cx="365194" cy="1570335"/>
         </a:xfrm>
         <a:custGeom>
           <a:avLst/>
@@ -4393,13 +4476,74 @@
                 <a:pt x="0" y="0"/>
               </a:moveTo>
               <a:lnTo>
-                <a:pt x="175391" y="0"/>
+                <a:pt x="182597" y="0"/>
               </a:lnTo>
               <a:lnTo>
-                <a:pt x="175391" y="1131274"/>
+                <a:pt x="182597" y="1570335"/>
               </a:lnTo>
               <a:lnTo>
-                <a:pt x="350782" y="1131274"/>
+                <a:pt x="365194" y="1570335"/>
+              </a:lnTo>
+            </a:path>
+          </a:pathLst>
+        </a:custGeom>
+        <a:noFill/>
+        <a:ln w="12700" cap="flat" cmpd="sng" algn="ctr">
+          <a:solidFill>
+            <a:schemeClr val="accent3">
+              <a:hueOff val="0"/>
+              <a:satOff val="0"/>
+              <a:lumOff val="0"/>
+              <a:alphaOff val="0"/>
+            </a:schemeClr>
+          </a:solidFill>
+          <a:prstDash val="solid"/>
+          <a:miter lim="800000"/>
+        </a:ln>
+        <a:effectLst/>
+      </dsp:spPr>
+      <dsp:style>
+        <a:lnRef idx="2">
+          <a:scrgbClr r="0" g="0" b="0"/>
+        </a:lnRef>
+        <a:fillRef idx="0">
+          <a:scrgbClr r="0" g="0" b="0"/>
+        </a:fillRef>
+        <a:effectRef idx="0">
+          <a:scrgbClr r="0" g="0" b="0"/>
+        </a:effectRef>
+        <a:fontRef idx="minor"/>
+      </dsp:style>
+    </dsp:sp>
+    <dsp:sp modelId="{E7D06081-E8B9-4481-A220-83A839937B9C}">
+      <dsp:nvSpPr>
+        <dsp:cNvPr id="0" name=""/>
+        <dsp:cNvSpPr/>
+      </dsp:nvSpPr>
+      <dsp:spPr>
+        <a:xfrm>
+          <a:off x="4019601" y="4999335"/>
+          <a:ext cx="365194" cy="785167"/>
+        </a:xfrm>
+        <a:custGeom>
+          <a:avLst/>
+          <a:gdLst/>
+          <a:ahLst/>
+          <a:cxnLst/>
+          <a:rect l="0" t="0" r="0" b="0"/>
+          <a:pathLst>
+            <a:path>
+              <a:moveTo>
+                <a:pt x="0" y="0"/>
+              </a:moveTo>
+              <a:lnTo>
+                <a:pt x="182597" y="0"/>
+              </a:lnTo>
+              <a:lnTo>
+                <a:pt x="182597" y="785167"/>
+              </a:lnTo>
+              <a:lnTo>
+                <a:pt x="365194" y="785167"/>
               </a:lnTo>
             </a:path>
           </a:pathLst>
@@ -4439,8 +4583,8 @@
       </dsp:nvSpPr>
       <dsp:spPr>
         <a:xfrm>
-          <a:off x="3860581" y="5571895"/>
-          <a:ext cx="350782" cy="377091"/>
+          <a:off x="4019601" y="4953615"/>
+          <a:ext cx="365194" cy="91440"/>
         </a:xfrm>
         <a:custGeom>
           <a:avLst/>
@@ -4451,16 +4595,10 @@
           <a:pathLst>
             <a:path>
               <a:moveTo>
-                <a:pt x="0" y="0"/>
+                <a:pt x="0" y="45720"/>
               </a:moveTo>
               <a:lnTo>
-                <a:pt x="175391" y="0"/>
-              </a:lnTo>
-              <a:lnTo>
-                <a:pt x="175391" y="377091"/>
-              </a:lnTo>
-              <a:lnTo>
-                <a:pt x="350782" y="377091"/>
+                <a:pt x="365194" y="45720"/>
               </a:lnTo>
             </a:path>
           </a:pathLst>
@@ -4500,8 +4638,8 @@
       </dsp:nvSpPr>
       <dsp:spPr>
         <a:xfrm>
-          <a:off x="3860581" y="5194803"/>
-          <a:ext cx="350782" cy="377091"/>
+          <a:off x="4019601" y="4214167"/>
+          <a:ext cx="365194" cy="785167"/>
         </a:xfrm>
         <a:custGeom>
           <a:avLst/>
@@ -4512,16 +4650,16 @@
           <a:pathLst>
             <a:path>
               <a:moveTo>
-                <a:pt x="0" y="377091"/>
+                <a:pt x="0" y="785167"/>
               </a:moveTo>
               <a:lnTo>
-                <a:pt x="175391" y="377091"/>
+                <a:pt x="182597" y="785167"/>
               </a:lnTo>
               <a:lnTo>
-                <a:pt x="175391" y="0"/>
+                <a:pt x="182597" y="0"/>
               </a:lnTo>
               <a:lnTo>
-                <a:pt x="350782" y="0"/>
+                <a:pt x="365194" y="0"/>
               </a:lnTo>
             </a:path>
           </a:pathLst>
@@ -4561,8 +4699,8 @@
       </dsp:nvSpPr>
       <dsp:spPr>
         <a:xfrm>
-          <a:off x="3860581" y="4440621"/>
-          <a:ext cx="350782" cy="1131274"/>
+          <a:off x="4019601" y="3429000"/>
+          <a:ext cx="365194" cy="1570335"/>
         </a:xfrm>
         <a:custGeom>
           <a:avLst/>
@@ -4573,16 +4711,16 @@
           <a:pathLst>
             <a:path>
               <a:moveTo>
-                <a:pt x="0" y="1131274"/>
+                <a:pt x="0" y="1570335"/>
               </a:moveTo>
               <a:lnTo>
-                <a:pt x="175391" y="1131274"/>
+                <a:pt x="182597" y="1570335"/>
               </a:lnTo>
               <a:lnTo>
-                <a:pt x="175391" y="0"/>
+                <a:pt x="182597" y="0"/>
               </a:lnTo>
               <a:lnTo>
-                <a:pt x="350782" y="0"/>
+                <a:pt x="365194" y="0"/>
               </a:lnTo>
             </a:path>
           </a:pathLst>
@@ -4622,8 +4760,8 @@
       </dsp:nvSpPr>
       <dsp:spPr>
         <a:xfrm>
-          <a:off x="1755884" y="4063529"/>
-          <a:ext cx="350782" cy="1508365"/>
+          <a:off x="1828436" y="2840124"/>
+          <a:ext cx="365194" cy="2159210"/>
         </a:xfrm>
         <a:custGeom>
           <a:avLst/>
@@ -4637,13 +4775,13 @@
                 <a:pt x="0" y="0"/>
               </a:moveTo>
               <a:lnTo>
-                <a:pt x="175391" y="0"/>
+                <a:pt x="182597" y="0"/>
               </a:lnTo>
               <a:lnTo>
-                <a:pt x="175391" y="1508365"/>
+                <a:pt x="182597" y="2159210"/>
               </a:lnTo>
               <a:lnTo>
-                <a:pt x="350782" y="1508365"/>
+                <a:pt x="365194" y="2159210"/>
               </a:lnTo>
             </a:path>
           </a:pathLst>
@@ -4683,8 +4821,8 @@
       </dsp:nvSpPr>
       <dsp:spPr>
         <a:xfrm>
-          <a:off x="1755884" y="4063529"/>
-          <a:ext cx="350782" cy="377091"/>
+          <a:off x="1828436" y="2840124"/>
+          <a:ext cx="365194" cy="196291"/>
         </a:xfrm>
         <a:custGeom>
           <a:avLst/>
@@ -4698,13 +4836,13 @@
                 <a:pt x="0" y="0"/>
               </a:moveTo>
               <a:lnTo>
-                <a:pt x="175391" y="0"/>
+                <a:pt x="182597" y="0"/>
               </a:lnTo>
               <a:lnTo>
-                <a:pt x="175391" y="377091"/>
+                <a:pt x="182597" y="196291"/>
               </a:lnTo>
               <a:lnTo>
-                <a:pt x="350782" y="377091"/>
+                <a:pt x="365194" y="196291"/>
               </a:lnTo>
             </a:path>
           </a:pathLst>
@@ -4744,8 +4882,8 @@
       </dsp:nvSpPr>
       <dsp:spPr>
         <a:xfrm>
-          <a:off x="5965277" y="3640718"/>
-          <a:ext cx="350782" cy="91440"/>
+          <a:off x="4019601" y="2251248"/>
+          <a:ext cx="365194" cy="392583"/>
         </a:xfrm>
         <a:custGeom>
           <a:avLst/>
@@ -4756,10 +4894,16 @@
           <a:pathLst>
             <a:path>
               <a:moveTo>
-                <a:pt x="0" y="45720"/>
+                <a:pt x="0" y="0"/>
               </a:moveTo>
               <a:lnTo>
-                <a:pt x="350782" y="45720"/>
+                <a:pt x="182597" y="0"/>
+              </a:lnTo>
+              <a:lnTo>
+                <a:pt x="182597" y="392583"/>
+              </a:lnTo>
+              <a:lnTo>
+                <a:pt x="365194" y="392583"/>
               </a:lnTo>
             </a:path>
           </a:pathLst>
@@ -4767,7 +4911,7 @@
         <a:noFill/>
         <a:ln w="12700" cap="flat" cmpd="sng" algn="ctr">
           <a:solidFill>
-            <a:schemeClr val="accent4">
+            <a:schemeClr val="accent3">
               <a:hueOff val="0"/>
               <a:satOff val="0"/>
               <a:lumOff val="0"/>
@@ -4799,8 +4943,8 @@
       </dsp:nvSpPr>
       <dsp:spPr>
         <a:xfrm>
-          <a:off x="3860581" y="3640718"/>
-          <a:ext cx="350782" cy="91440"/>
+          <a:off x="4019601" y="1858664"/>
+          <a:ext cx="365194" cy="392583"/>
         </a:xfrm>
         <a:custGeom>
           <a:avLst/>
@@ -4811,10 +4955,16 @@
           <a:pathLst>
             <a:path>
               <a:moveTo>
-                <a:pt x="0" y="45720"/>
+                <a:pt x="0" y="392583"/>
               </a:moveTo>
               <a:lnTo>
-                <a:pt x="350782" y="45720"/>
+                <a:pt x="182597" y="392583"/>
+              </a:lnTo>
+              <a:lnTo>
+                <a:pt x="182597" y="0"/>
+              </a:lnTo>
+              <a:lnTo>
+                <a:pt x="365194" y="0"/>
               </a:lnTo>
             </a:path>
           </a:pathLst>
@@ -4854,8 +5004,8 @@
       </dsp:nvSpPr>
       <dsp:spPr>
         <a:xfrm>
-          <a:off x="1755884" y="3686438"/>
-          <a:ext cx="350782" cy="377091"/>
+          <a:off x="1828436" y="2251248"/>
+          <a:ext cx="365194" cy="588875"/>
         </a:xfrm>
         <a:custGeom>
           <a:avLst/>
@@ -4866,16 +5016,16 @@
           <a:pathLst>
             <a:path>
               <a:moveTo>
-                <a:pt x="0" y="377091"/>
+                <a:pt x="0" y="588875"/>
               </a:moveTo>
               <a:lnTo>
-                <a:pt x="175391" y="377091"/>
+                <a:pt x="182597" y="588875"/>
               </a:lnTo>
               <a:lnTo>
-                <a:pt x="175391" y="0"/>
+                <a:pt x="182597" y="0"/>
               </a:lnTo>
               <a:lnTo>
-                <a:pt x="350782" y="0"/>
+                <a:pt x="365194" y="0"/>
               </a:lnTo>
             </a:path>
           </a:pathLst>
@@ -4915,8 +5065,8 @@
       </dsp:nvSpPr>
       <dsp:spPr>
         <a:xfrm>
-          <a:off x="3860581" y="2555163"/>
-          <a:ext cx="350782" cy="377091"/>
+          <a:off x="4019601" y="680913"/>
+          <a:ext cx="365194" cy="392583"/>
         </a:xfrm>
         <a:custGeom>
           <a:avLst/>
@@ -4930,13 +5080,13 @@
                 <a:pt x="0" y="0"/>
               </a:moveTo>
               <a:lnTo>
-                <a:pt x="175391" y="0"/>
+                <a:pt x="182597" y="0"/>
               </a:lnTo>
               <a:lnTo>
-                <a:pt x="175391" y="377091"/>
+                <a:pt x="182597" y="392583"/>
               </a:lnTo>
               <a:lnTo>
-                <a:pt x="350782" y="377091"/>
+                <a:pt x="365194" y="392583"/>
               </a:lnTo>
             </a:path>
           </a:pathLst>
@@ -4976,8 +5126,8 @@
       </dsp:nvSpPr>
       <dsp:spPr>
         <a:xfrm>
-          <a:off x="3860581" y="2178072"/>
-          <a:ext cx="350782" cy="377091"/>
+          <a:off x="4019601" y="288329"/>
+          <a:ext cx="365194" cy="392583"/>
         </a:xfrm>
         <a:custGeom>
           <a:avLst/>
@@ -4988,16 +5138,16 @@
           <a:pathLst>
             <a:path>
               <a:moveTo>
-                <a:pt x="0" y="377091"/>
+                <a:pt x="0" y="392583"/>
               </a:moveTo>
               <a:lnTo>
-                <a:pt x="175391" y="377091"/>
+                <a:pt x="182597" y="392583"/>
               </a:lnTo>
               <a:lnTo>
-                <a:pt x="175391" y="0"/>
+                <a:pt x="182597" y="0"/>
               </a:lnTo>
               <a:lnTo>
-                <a:pt x="350782" y="0"/>
+                <a:pt x="365194" y="0"/>
               </a:lnTo>
             </a:path>
           </a:pathLst>
@@ -5037,8 +5187,8 @@
       </dsp:nvSpPr>
       <dsp:spPr>
         <a:xfrm>
-          <a:off x="1755884" y="2555163"/>
-          <a:ext cx="350782" cy="1508365"/>
+          <a:off x="1828436" y="680913"/>
+          <a:ext cx="365194" cy="2159210"/>
         </a:xfrm>
         <a:custGeom>
           <a:avLst/>
@@ -5049,16 +5199,16 @@
           <a:pathLst>
             <a:path>
               <a:moveTo>
-                <a:pt x="0" y="1508365"/>
+                <a:pt x="0" y="2159210"/>
               </a:moveTo>
               <a:lnTo>
-                <a:pt x="175391" y="1508365"/>
+                <a:pt x="182597" y="2159210"/>
               </a:lnTo>
               <a:lnTo>
-                <a:pt x="175391" y="0"/>
+                <a:pt x="182597" y="0"/>
               </a:lnTo>
               <a:lnTo>
-                <a:pt x="350782" y="0"/>
+                <a:pt x="365194" y="0"/>
               </a:lnTo>
             </a:path>
           </a:pathLst>
@@ -5098,8 +5248,8 @@
       </dsp:nvSpPr>
       <dsp:spPr>
         <a:xfrm>
-          <a:off x="1970" y="3796057"/>
-          <a:ext cx="1753913" cy="534943"/>
+          <a:off x="2464" y="2561663"/>
+          <a:ext cx="1825971" cy="556921"/>
         </a:xfrm>
         <a:prstGeom prst="rect">
           <a:avLst/>
@@ -5159,14 +5309,14 @@
             <a:buNone/>
           </a:pPr>
           <a:r>
-            <a:rPr lang="en-SG" sz="1500" kern="1200"/>
+            <a:rPr lang="en-SG" sz="1500" kern="1200" dirty="0"/>
             <a:t>Base year data:</a:t>
           </a:r>
         </a:p>
       </dsp:txBody>
       <dsp:txXfrm>
-        <a:off x="1970" y="3796057"/>
-        <a:ext cx="1753913" cy="534943"/>
+        <a:off x="2464" y="2561663"/>
+        <a:ext cx="1825971" cy="556921"/>
       </dsp:txXfrm>
     </dsp:sp>
     <dsp:sp modelId="{C9609E3C-6E47-4013-9A14-440FE5BEB813}">
@@ -5176,8 +5326,8 @@
       </dsp:nvSpPr>
       <dsp:spPr>
         <a:xfrm>
-          <a:off x="2106667" y="2287691"/>
-          <a:ext cx="1753913" cy="534943"/>
+          <a:off x="2193630" y="402452"/>
+          <a:ext cx="1825971" cy="556921"/>
         </a:xfrm>
         <a:prstGeom prst="rect">
           <a:avLst/>
@@ -5237,14 +5387,14 @@
             <a:buNone/>
           </a:pPr>
           <a:r>
-            <a:rPr lang="en-SG" sz="1500" kern="1200"/>
+            <a:rPr lang="en-SG" sz="1500" kern="1200" dirty="0"/>
             <a:t>Activity</a:t>
           </a:r>
         </a:p>
       </dsp:txBody>
       <dsp:txXfrm>
-        <a:off x="2106667" y="2287691"/>
-        <a:ext cx="1753913" cy="534943"/>
+        <a:off x="2193630" y="402452"/>
+        <a:ext cx="1825971" cy="556921"/>
       </dsp:txXfrm>
     </dsp:sp>
     <dsp:sp modelId="{AB12C268-67EE-4FDF-A87A-0E273608076B}">
@@ -5254,8 +5404,8 @@
       </dsp:nvSpPr>
       <dsp:spPr>
         <a:xfrm>
-          <a:off x="4211363" y="1910600"/>
-          <a:ext cx="1753913" cy="534943"/>
+          <a:off x="4384795" y="9868"/>
+          <a:ext cx="1825971" cy="556921"/>
         </a:xfrm>
         <a:prstGeom prst="rect">
           <a:avLst/>
@@ -5315,14 +5465,14 @@
             <a:buNone/>
           </a:pPr>
           <a:r>
-            <a:rPr lang="en-SG" sz="1500" kern="1200"/>
+            <a:rPr lang="en-SG" sz="1500" kern="1200" dirty="0"/>
             <a:t>Freight tonne km</a:t>
           </a:r>
         </a:p>
       </dsp:txBody>
       <dsp:txXfrm>
-        <a:off x="4211363" y="1910600"/>
-        <a:ext cx="1753913" cy="534943"/>
+        <a:off x="4384795" y="9868"/>
+        <a:ext cx="1825971" cy="556921"/>
       </dsp:txXfrm>
     </dsp:sp>
     <dsp:sp modelId="{4E79214B-AE78-4A18-BF84-9B8E3F6105F1}">
@@ -5332,8 +5482,8 @@
       </dsp:nvSpPr>
       <dsp:spPr>
         <a:xfrm>
-          <a:off x="4211363" y="2664783"/>
-          <a:ext cx="1753913" cy="534943"/>
+          <a:off x="4384795" y="795036"/>
+          <a:ext cx="1825971" cy="556921"/>
         </a:xfrm>
         <a:prstGeom prst="rect">
           <a:avLst/>
@@ -5393,14 +5543,18 @@
             <a:buNone/>
           </a:pPr>
           <a:r>
-            <a:rPr lang="en-SG" sz="1500" kern="1200"/>
-            <a:t>Passsenger km</a:t>
+            <a:rPr lang="en-SG" sz="1500" kern="1200" dirty="0" err="1"/>
+            <a:t>Passsenger</a:t>
+          </a:r>
+          <a:r>
+            <a:rPr lang="en-SG" sz="1500" kern="1200" dirty="0"/>
+            <a:t> km</a:t>
           </a:r>
         </a:p>
       </dsp:txBody>
       <dsp:txXfrm>
-        <a:off x="4211363" y="2664783"/>
-        <a:ext cx="1753913" cy="534943"/>
+        <a:off x="4384795" y="795036"/>
+        <a:ext cx="1825971" cy="556921"/>
       </dsp:txXfrm>
     </dsp:sp>
     <dsp:sp modelId="{9B140528-1195-40A0-999B-8041A8CEED55}">
@@ -5410,8 +5564,8 @@
       </dsp:nvSpPr>
       <dsp:spPr>
         <a:xfrm>
-          <a:off x="2106667" y="3418966"/>
-          <a:ext cx="1753913" cy="534943"/>
+          <a:off x="2193630" y="1972787"/>
+          <a:ext cx="1825971" cy="556921"/>
         </a:xfrm>
         <a:prstGeom prst="rect">
           <a:avLst/>
@@ -5471,14 +5625,14 @@
             <a:buNone/>
           </a:pPr>
           <a:r>
-            <a:rPr lang="en-SG" sz="1500" kern="1200"/>
+            <a:rPr lang="en-SG" sz="1500" kern="1200" dirty="0"/>
             <a:t>Energy</a:t>
           </a:r>
         </a:p>
       </dsp:txBody>
       <dsp:txXfrm>
-        <a:off x="2106667" y="3418966"/>
-        <a:ext cx="1753913" cy="534943"/>
+        <a:off x="2193630" y="1972787"/>
+        <a:ext cx="1825971" cy="556921"/>
       </dsp:txXfrm>
     </dsp:sp>
     <dsp:sp modelId="{BC9CBE9A-F4A2-4A21-9D53-4EC382D0FEDD}">
@@ -5488,8 +5642,8 @@
       </dsp:nvSpPr>
       <dsp:spPr>
         <a:xfrm>
-          <a:off x="4211363" y="3418966"/>
-          <a:ext cx="1753913" cy="534943"/>
+          <a:off x="4384795" y="1580204"/>
+          <a:ext cx="1825971" cy="556921"/>
         </a:xfrm>
         <a:prstGeom prst="rect">
           <a:avLst/>
@@ -5549,14 +5703,14 @@
             <a:buNone/>
           </a:pPr>
           <a:r>
-            <a:rPr lang="en-SG" sz="1500" kern="1200"/>
-            <a:t>Energy use by drive type</a:t>
+            <a:rPr lang="en-SG" sz="1500" kern="1200" dirty="0"/>
+            <a:t>Energy use by drive type (road only)</a:t>
           </a:r>
         </a:p>
       </dsp:txBody>
       <dsp:txXfrm>
-        <a:off x="4211363" y="3418966"/>
-        <a:ext cx="1753913" cy="534943"/>
+        <a:off x="4384795" y="1580204"/>
+        <a:ext cx="1825971" cy="556921"/>
       </dsp:txXfrm>
     </dsp:sp>
     <dsp:sp modelId="{952258F3-7A3E-439D-A889-C893A783FC7F}">
@@ -5566,14 +5720,14 @@
       </dsp:nvSpPr>
       <dsp:spPr>
         <a:xfrm>
-          <a:off x="6316060" y="3418966"/>
-          <a:ext cx="1753913" cy="534943"/>
+          <a:off x="4384795" y="2365371"/>
+          <a:ext cx="1825971" cy="556921"/>
         </a:xfrm>
         <a:prstGeom prst="rect">
           <a:avLst/>
         </a:prstGeom>
         <a:solidFill>
-          <a:schemeClr val="accent4">
+          <a:schemeClr val="accent3">
             <a:hueOff val="0"/>
             <a:satOff val="0"/>
             <a:lumOff val="0"/>
@@ -5627,14 +5781,14 @@
             <a:buNone/>
           </a:pPr>
           <a:r>
-            <a:rPr lang="en-SG" sz="1500" kern="1200"/>
+            <a:rPr lang="en-SG" sz="1500" kern="1200" dirty="0"/>
             <a:t>Energy use by fuel type</a:t>
           </a:r>
         </a:p>
       </dsp:txBody>
       <dsp:txXfrm>
-        <a:off x="6316060" y="3418966"/>
-        <a:ext cx="1753913" cy="534943"/>
+        <a:off x="4384795" y="2365371"/>
+        <a:ext cx="1825971" cy="556921"/>
       </dsp:txXfrm>
     </dsp:sp>
     <dsp:sp modelId="{A6DB2E35-A91B-4895-B749-B5B7F47454F3}">
@@ -5644,8 +5798,8 @@
       </dsp:nvSpPr>
       <dsp:spPr>
         <a:xfrm>
-          <a:off x="2106667" y="4173149"/>
-          <a:ext cx="1753913" cy="534943"/>
+          <a:off x="2193630" y="2757955"/>
+          <a:ext cx="1825971" cy="556921"/>
         </a:xfrm>
         <a:prstGeom prst="rect">
           <a:avLst/>
@@ -5705,14 +5859,14 @@
             <a:buNone/>
           </a:pPr>
           <a:r>
-            <a:rPr lang="en-SG" sz="1500" kern="1200"/>
-            <a:t>Stocks</a:t>
+            <a:rPr lang="en-SG" sz="1500" kern="1200" dirty="0"/>
+            <a:t>Stocks (road only)</a:t>
           </a:r>
         </a:p>
       </dsp:txBody>
       <dsp:txXfrm>
-        <a:off x="2106667" y="4173149"/>
-        <a:ext cx="1753913" cy="534943"/>
+        <a:off x="2193630" y="2757955"/>
+        <a:ext cx="1825971" cy="556921"/>
       </dsp:txXfrm>
     </dsp:sp>
     <dsp:sp modelId="{3AE5A43E-07B9-4637-95D2-B27F2399A626}">
@@ -5722,8 +5876,8 @@
       </dsp:nvSpPr>
       <dsp:spPr>
         <a:xfrm>
-          <a:off x="2106667" y="5304423"/>
-          <a:ext cx="1753913" cy="534943"/>
+          <a:off x="2193630" y="4720874"/>
+          <a:ext cx="1825971" cy="556921"/>
         </a:xfrm>
         <a:prstGeom prst="rect">
           <a:avLst/>
@@ -5789,8 +5943,8 @@
         </a:p>
       </dsp:txBody>
       <dsp:txXfrm>
-        <a:off x="2106667" y="5304423"/>
-        <a:ext cx="1753913" cy="534943"/>
+        <a:off x="2193630" y="4720874"/>
+        <a:ext cx="1825971" cy="556921"/>
       </dsp:txXfrm>
     </dsp:sp>
     <dsp:sp modelId="{BA2A8497-6940-4B72-878A-0D81DFD00DF7}">
@@ -5800,242 +5954,8 @@
       </dsp:nvSpPr>
       <dsp:spPr>
         <a:xfrm>
-          <a:off x="4211363" y="4173149"/>
-          <a:ext cx="1753913" cy="534943"/>
-        </a:xfrm>
-        <a:prstGeom prst="rect">
-          <a:avLst/>
-        </a:prstGeom>
-        <a:solidFill>
-          <a:schemeClr val="accent3">
-            <a:hueOff val="0"/>
-            <a:satOff val="0"/>
-            <a:lumOff val="0"/>
-            <a:alphaOff val="0"/>
-          </a:schemeClr>
-        </a:solidFill>
-        <a:ln w="12700" cap="flat" cmpd="sng" algn="ctr">
-          <a:solidFill>
-            <a:schemeClr val="lt1">
-              <a:hueOff val="0"/>
-              <a:satOff val="0"/>
-              <a:lumOff val="0"/>
-              <a:alphaOff val="0"/>
-            </a:schemeClr>
-          </a:solidFill>
-          <a:prstDash val="solid"/>
-          <a:miter lim="800000"/>
-        </a:ln>
-        <a:effectLst/>
-      </dsp:spPr>
-      <dsp:style>
-        <a:lnRef idx="2">
-          <a:scrgbClr r="0" g="0" b="0"/>
-        </a:lnRef>
-        <a:fillRef idx="1">
-          <a:scrgbClr r="0" g="0" b="0"/>
-        </a:fillRef>
-        <a:effectRef idx="0">
-          <a:scrgbClr r="0" g="0" b="0"/>
-        </a:effectRef>
-        <a:fontRef idx="minor">
-          <a:schemeClr val="lt1"/>
-        </a:fontRef>
-      </dsp:style>
-      <dsp:txBody>
-        <a:bodyPr spcFirstLastPara="0" vert="horz" wrap="square" lIns="9525" tIns="9525" rIns="9525" bIns="9525" numCol="1" spcCol="1270" anchor="ctr" anchorCtr="0">
-          <a:noAutofit/>
-        </a:bodyPr>
-        <a:lstStyle/>
-        <a:p>
-          <a:pPr marL="0" lvl="0" indent="0" algn="ctr" defTabSz="666750">
-            <a:lnSpc>
-              <a:spcPct val="90000"/>
-            </a:lnSpc>
-            <a:spcBef>
-              <a:spcPct val="0"/>
-            </a:spcBef>
-            <a:spcAft>
-              <a:spcPct val="35000"/>
-            </a:spcAft>
-            <a:buNone/>
-          </a:pPr>
-          <a:r>
-            <a:rPr lang="en-SG" sz="1500" kern="1200"/>
-            <a:t>Turnover rates</a:t>
-          </a:r>
-        </a:p>
-      </dsp:txBody>
-      <dsp:txXfrm>
-        <a:off x="4211363" y="4173149"/>
-        <a:ext cx="1753913" cy="534943"/>
-      </dsp:txXfrm>
-    </dsp:sp>
-    <dsp:sp modelId="{DBE83B29-5E1E-467E-A745-7B27708AFD8C}">
-      <dsp:nvSpPr>
-        <dsp:cNvPr id="0" name=""/>
-        <dsp:cNvSpPr/>
-      </dsp:nvSpPr>
-      <dsp:spPr>
-        <a:xfrm>
-          <a:off x="4211363" y="4927332"/>
-          <a:ext cx="1753913" cy="534943"/>
-        </a:xfrm>
-        <a:prstGeom prst="rect">
-          <a:avLst/>
-        </a:prstGeom>
-        <a:solidFill>
-          <a:schemeClr val="accent3">
-            <a:hueOff val="0"/>
-            <a:satOff val="0"/>
-            <a:lumOff val="0"/>
-            <a:alphaOff val="0"/>
-          </a:schemeClr>
-        </a:solidFill>
-        <a:ln w="12700" cap="flat" cmpd="sng" algn="ctr">
-          <a:solidFill>
-            <a:schemeClr val="lt1">
-              <a:hueOff val="0"/>
-              <a:satOff val="0"/>
-              <a:lumOff val="0"/>
-              <a:alphaOff val="0"/>
-            </a:schemeClr>
-          </a:solidFill>
-          <a:prstDash val="solid"/>
-          <a:miter lim="800000"/>
-        </a:ln>
-        <a:effectLst/>
-      </dsp:spPr>
-      <dsp:style>
-        <a:lnRef idx="2">
-          <a:scrgbClr r="0" g="0" b="0"/>
-        </a:lnRef>
-        <a:fillRef idx="1">
-          <a:scrgbClr r="0" g="0" b="0"/>
-        </a:fillRef>
-        <a:effectRef idx="0">
-          <a:scrgbClr r="0" g="0" b="0"/>
-        </a:effectRef>
-        <a:fontRef idx="minor">
-          <a:schemeClr val="lt1"/>
-        </a:fontRef>
-      </dsp:style>
-      <dsp:txBody>
-        <a:bodyPr spcFirstLastPara="0" vert="horz" wrap="square" lIns="9525" tIns="9525" rIns="9525" bIns="9525" numCol="1" spcCol="1270" anchor="ctr" anchorCtr="0">
-          <a:noAutofit/>
-        </a:bodyPr>
-        <a:lstStyle/>
-        <a:p>
-          <a:pPr marL="0" lvl="0" indent="0" algn="ctr" defTabSz="666750">
-            <a:lnSpc>
-              <a:spcPct val="90000"/>
-            </a:lnSpc>
-            <a:spcBef>
-              <a:spcPct val="0"/>
-            </a:spcBef>
-            <a:spcAft>
-              <a:spcPct val="35000"/>
-            </a:spcAft>
-            <a:buNone/>
-          </a:pPr>
-          <a:r>
-            <a:rPr lang="en-SG" sz="1500" kern="1200"/>
-            <a:t>Occupancy and load factors</a:t>
-          </a:r>
-        </a:p>
-      </dsp:txBody>
-      <dsp:txXfrm>
-        <a:off x="4211363" y="4927332"/>
-        <a:ext cx="1753913" cy="534943"/>
-      </dsp:txXfrm>
-    </dsp:sp>
-    <dsp:sp modelId="{478FA14F-17B9-4C3C-B3CD-A9A00FD127CD}">
-      <dsp:nvSpPr>
-        <dsp:cNvPr id="0" name=""/>
-        <dsp:cNvSpPr/>
-      </dsp:nvSpPr>
-      <dsp:spPr>
-        <a:xfrm>
-          <a:off x="4211363" y="5681515"/>
-          <a:ext cx="1753913" cy="534943"/>
-        </a:xfrm>
-        <a:prstGeom prst="rect">
-          <a:avLst/>
-        </a:prstGeom>
-        <a:solidFill>
-          <a:schemeClr val="accent3">
-            <a:hueOff val="0"/>
-            <a:satOff val="0"/>
-            <a:lumOff val="0"/>
-            <a:alphaOff val="0"/>
-          </a:schemeClr>
-        </a:solidFill>
-        <a:ln w="12700" cap="flat" cmpd="sng" algn="ctr">
-          <a:solidFill>
-            <a:schemeClr val="lt1">
-              <a:hueOff val="0"/>
-              <a:satOff val="0"/>
-              <a:lumOff val="0"/>
-              <a:alphaOff val="0"/>
-            </a:schemeClr>
-          </a:solidFill>
-          <a:prstDash val="solid"/>
-          <a:miter lim="800000"/>
-        </a:ln>
-        <a:effectLst/>
-      </dsp:spPr>
-      <dsp:style>
-        <a:lnRef idx="2">
-          <a:scrgbClr r="0" g="0" b="0"/>
-        </a:lnRef>
-        <a:fillRef idx="1">
-          <a:scrgbClr r="0" g="0" b="0"/>
-        </a:fillRef>
-        <a:effectRef idx="0">
-          <a:scrgbClr r="0" g="0" b="0"/>
-        </a:effectRef>
-        <a:fontRef idx="minor">
-          <a:schemeClr val="lt1"/>
-        </a:fontRef>
-      </dsp:style>
-      <dsp:txBody>
-        <a:bodyPr spcFirstLastPara="0" vert="horz" wrap="square" lIns="9525" tIns="9525" rIns="9525" bIns="9525" numCol="1" spcCol="1270" anchor="ctr" anchorCtr="0">
-          <a:noAutofit/>
-        </a:bodyPr>
-        <a:lstStyle/>
-        <a:p>
-          <a:pPr marL="0" lvl="0" indent="0" algn="ctr" defTabSz="666750">
-            <a:lnSpc>
-              <a:spcPct val="90000"/>
-            </a:lnSpc>
-            <a:spcBef>
-              <a:spcPct val="0"/>
-            </a:spcBef>
-            <a:spcAft>
-              <a:spcPct val="35000"/>
-            </a:spcAft>
-            <a:buNone/>
-          </a:pPr>
-          <a:r>
-            <a:rPr lang="en-SG" sz="1500" kern="1200"/>
-            <a:t>New vehicle efficiency</a:t>
-          </a:r>
-        </a:p>
-      </dsp:txBody>
-      <dsp:txXfrm>
-        <a:off x="4211363" y="5681515"/>
-        <a:ext cx="1753913" cy="534943"/>
-      </dsp:txXfrm>
-    </dsp:sp>
-    <dsp:sp modelId="{F64C9670-F9D3-4B2E-950B-F708FDA3711F}">
-      <dsp:nvSpPr>
-        <dsp:cNvPr id="0" name=""/>
-        <dsp:cNvSpPr/>
-      </dsp:nvSpPr>
-      <dsp:spPr>
-        <a:xfrm>
-          <a:off x="4211363" y="6435697"/>
-          <a:ext cx="1753913" cy="534943"/>
+          <a:off x="4384795" y="3150539"/>
+          <a:ext cx="1825971" cy="556921"/>
         </a:xfrm>
         <a:prstGeom prst="rect">
           <a:avLst/>
@@ -6096,18 +6016,325 @@
           </a:pPr>
           <a:r>
             <a:rPr lang="en-SG" sz="1500" kern="1200" dirty="0"/>
-            <a:t>Non </a:t>
+            <a:t>Turnover rates (road only)</a:t>
           </a:r>
-          <a:r>
-            <a:rPr lang="en-SG" sz="1500" kern="1200"/>
-            <a:t>road efficiency</a:t>
-          </a:r>
-          <a:endParaRPr lang="en-SG" sz="1500" kern="1200" dirty="0"/>
         </a:p>
       </dsp:txBody>
       <dsp:txXfrm>
-        <a:off x="4211363" y="6435697"/>
-        <a:ext cx="1753913" cy="534943"/>
+        <a:off x="4384795" y="3150539"/>
+        <a:ext cx="1825971" cy="556921"/>
+      </dsp:txXfrm>
+    </dsp:sp>
+    <dsp:sp modelId="{DBE83B29-5E1E-467E-A745-7B27708AFD8C}">
+      <dsp:nvSpPr>
+        <dsp:cNvPr id="0" name=""/>
+        <dsp:cNvSpPr/>
+      </dsp:nvSpPr>
+      <dsp:spPr>
+        <a:xfrm>
+          <a:off x="4384795" y="3935707"/>
+          <a:ext cx="1825971" cy="556921"/>
+        </a:xfrm>
+        <a:prstGeom prst="rect">
+          <a:avLst/>
+        </a:prstGeom>
+        <a:solidFill>
+          <a:schemeClr val="accent3">
+            <a:hueOff val="0"/>
+            <a:satOff val="0"/>
+            <a:lumOff val="0"/>
+            <a:alphaOff val="0"/>
+          </a:schemeClr>
+        </a:solidFill>
+        <a:ln w="12700" cap="flat" cmpd="sng" algn="ctr">
+          <a:solidFill>
+            <a:schemeClr val="lt1">
+              <a:hueOff val="0"/>
+              <a:satOff val="0"/>
+              <a:lumOff val="0"/>
+              <a:alphaOff val="0"/>
+            </a:schemeClr>
+          </a:solidFill>
+          <a:prstDash val="solid"/>
+          <a:miter lim="800000"/>
+        </a:ln>
+        <a:effectLst/>
+      </dsp:spPr>
+      <dsp:style>
+        <a:lnRef idx="2">
+          <a:scrgbClr r="0" g="0" b="0"/>
+        </a:lnRef>
+        <a:fillRef idx="1">
+          <a:scrgbClr r="0" g="0" b="0"/>
+        </a:fillRef>
+        <a:effectRef idx="0">
+          <a:scrgbClr r="0" g="0" b="0"/>
+        </a:effectRef>
+        <a:fontRef idx="minor">
+          <a:schemeClr val="lt1"/>
+        </a:fontRef>
+      </dsp:style>
+      <dsp:txBody>
+        <a:bodyPr spcFirstLastPara="0" vert="horz" wrap="square" lIns="9525" tIns="9525" rIns="9525" bIns="9525" numCol="1" spcCol="1270" anchor="ctr" anchorCtr="0">
+          <a:noAutofit/>
+        </a:bodyPr>
+        <a:lstStyle/>
+        <a:p>
+          <a:pPr marL="0" lvl="0" indent="0" algn="ctr" defTabSz="666750">
+            <a:lnSpc>
+              <a:spcPct val="90000"/>
+            </a:lnSpc>
+            <a:spcBef>
+              <a:spcPct val="0"/>
+            </a:spcBef>
+            <a:spcAft>
+              <a:spcPct val="35000"/>
+            </a:spcAft>
+            <a:buNone/>
+          </a:pPr>
+          <a:r>
+            <a:rPr lang="en-SG" sz="1500" kern="1200" dirty="0"/>
+            <a:t>Occupancy and load factors (road only)</a:t>
+          </a:r>
+        </a:p>
+      </dsp:txBody>
+      <dsp:txXfrm>
+        <a:off x="4384795" y="3935707"/>
+        <a:ext cx="1825971" cy="556921"/>
+      </dsp:txXfrm>
+    </dsp:sp>
+    <dsp:sp modelId="{478FA14F-17B9-4C3C-B3CD-A9A00FD127CD}">
+      <dsp:nvSpPr>
+        <dsp:cNvPr id="0" name=""/>
+        <dsp:cNvSpPr/>
+      </dsp:nvSpPr>
+      <dsp:spPr>
+        <a:xfrm>
+          <a:off x="4384795" y="4720874"/>
+          <a:ext cx="1825971" cy="556921"/>
+        </a:xfrm>
+        <a:prstGeom prst="rect">
+          <a:avLst/>
+        </a:prstGeom>
+        <a:solidFill>
+          <a:schemeClr val="accent3">
+            <a:hueOff val="0"/>
+            <a:satOff val="0"/>
+            <a:lumOff val="0"/>
+            <a:alphaOff val="0"/>
+          </a:schemeClr>
+        </a:solidFill>
+        <a:ln w="12700" cap="flat" cmpd="sng" algn="ctr">
+          <a:solidFill>
+            <a:schemeClr val="lt1">
+              <a:hueOff val="0"/>
+              <a:satOff val="0"/>
+              <a:lumOff val="0"/>
+              <a:alphaOff val="0"/>
+            </a:schemeClr>
+          </a:solidFill>
+          <a:prstDash val="solid"/>
+          <a:miter lim="800000"/>
+        </a:ln>
+        <a:effectLst/>
+      </dsp:spPr>
+      <dsp:style>
+        <a:lnRef idx="2">
+          <a:scrgbClr r="0" g="0" b="0"/>
+        </a:lnRef>
+        <a:fillRef idx="1">
+          <a:scrgbClr r="0" g="0" b="0"/>
+        </a:fillRef>
+        <a:effectRef idx="0">
+          <a:scrgbClr r="0" g="0" b="0"/>
+        </a:effectRef>
+        <a:fontRef idx="minor">
+          <a:schemeClr val="lt1"/>
+        </a:fontRef>
+      </dsp:style>
+      <dsp:txBody>
+        <a:bodyPr spcFirstLastPara="0" vert="horz" wrap="square" lIns="9525" tIns="9525" rIns="9525" bIns="9525" numCol="1" spcCol="1270" anchor="ctr" anchorCtr="0">
+          <a:noAutofit/>
+        </a:bodyPr>
+        <a:lstStyle/>
+        <a:p>
+          <a:pPr marL="0" lvl="0" indent="0" algn="ctr" defTabSz="666750">
+            <a:lnSpc>
+              <a:spcPct val="90000"/>
+            </a:lnSpc>
+            <a:spcBef>
+              <a:spcPct val="0"/>
+            </a:spcBef>
+            <a:spcAft>
+              <a:spcPct val="35000"/>
+            </a:spcAft>
+            <a:buNone/>
+          </a:pPr>
+          <a:r>
+            <a:rPr lang="en-SG" sz="1500" kern="1200" dirty="0"/>
+            <a:t>New vehicle efficiency (road only)</a:t>
+          </a:r>
+        </a:p>
+      </dsp:txBody>
+      <dsp:txXfrm>
+        <a:off x="4384795" y="4720874"/>
+        <a:ext cx="1825971" cy="556921"/>
+      </dsp:txXfrm>
+    </dsp:sp>
+    <dsp:sp modelId="{5DF909A4-D1DD-4AAF-BFEC-DC2028097CB7}">
+      <dsp:nvSpPr>
+        <dsp:cNvPr id="0" name=""/>
+        <dsp:cNvSpPr/>
+      </dsp:nvSpPr>
+      <dsp:spPr>
+        <a:xfrm>
+          <a:off x="4384795" y="5506042"/>
+          <a:ext cx="1825971" cy="556921"/>
+        </a:xfrm>
+        <a:prstGeom prst="rect">
+          <a:avLst/>
+        </a:prstGeom>
+        <a:solidFill>
+          <a:schemeClr val="accent3">
+            <a:hueOff val="0"/>
+            <a:satOff val="0"/>
+            <a:lumOff val="0"/>
+            <a:alphaOff val="0"/>
+          </a:schemeClr>
+        </a:solidFill>
+        <a:ln w="12700" cap="flat" cmpd="sng" algn="ctr">
+          <a:solidFill>
+            <a:schemeClr val="lt1">
+              <a:hueOff val="0"/>
+              <a:satOff val="0"/>
+              <a:lumOff val="0"/>
+              <a:alphaOff val="0"/>
+            </a:schemeClr>
+          </a:solidFill>
+          <a:prstDash val="solid"/>
+          <a:miter lim="800000"/>
+        </a:ln>
+        <a:effectLst/>
+      </dsp:spPr>
+      <dsp:style>
+        <a:lnRef idx="2">
+          <a:scrgbClr r="0" g="0" b="0"/>
+        </a:lnRef>
+        <a:fillRef idx="1">
+          <a:scrgbClr r="0" g="0" b="0"/>
+        </a:fillRef>
+        <a:effectRef idx="0">
+          <a:scrgbClr r="0" g="0" b="0"/>
+        </a:effectRef>
+        <a:fontRef idx="minor">
+          <a:schemeClr val="lt1"/>
+        </a:fontRef>
+      </dsp:style>
+      <dsp:txBody>
+        <a:bodyPr spcFirstLastPara="0" vert="horz" wrap="square" lIns="9525" tIns="9525" rIns="9525" bIns="9525" numCol="1" spcCol="1270" anchor="ctr" anchorCtr="0">
+          <a:noAutofit/>
+        </a:bodyPr>
+        <a:lstStyle/>
+        <a:p>
+          <a:pPr marL="0" lvl="0" indent="0" algn="ctr" defTabSz="666750">
+            <a:lnSpc>
+              <a:spcPct val="90000"/>
+            </a:lnSpc>
+            <a:spcBef>
+              <a:spcPct val="0"/>
+            </a:spcBef>
+            <a:spcAft>
+              <a:spcPct val="35000"/>
+            </a:spcAft>
+            <a:buNone/>
+          </a:pPr>
+          <a:r>
+            <a:rPr lang="en-SG" sz="1500" kern="1200" dirty="0"/>
+            <a:t>Fuel mixing (e.g. biofuel mix %)</a:t>
+          </a:r>
+        </a:p>
+      </dsp:txBody>
+      <dsp:txXfrm>
+        <a:off x="4384795" y="5506042"/>
+        <a:ext cx="1825971" cy="556921"/>
+      </dsp:txXfrm>
+    </dsp:sp>
+    <dsp:sp modelId="{72D08835-297A-4D3F-AFF0-01081D88A8DD}">
+      <dsp:nvSpPr>
+        <dsp:cNvPr id="0" name=""/>
+        <dsp:cNvSpPr/>
+      </dsp:nvSpPr>
+      <dsp:spPr>
+        <a:xfrm>
+          <a:off x="4384795" y="6291209"/>
+          <a:ext cx="1825971" cy="556921"/>
+        </a:xfrm>
+        <a:prstGeom prst="rect">
+          <a:avLst/>
+        </a:prstGeom>
+        <a:solidFill>
+          <a:schemeClr val="accent3">
+            <a:hueOff val="0"/>
+            <a:satOff val="0"/>
+            <a:lumOff val="0"/>
+            <a:alphaOff val="0"/>
+          </a:schemeClr>
+        </a:solidFill>
+        <a:ln w="12700" cap="flat" cmpd="sng" algn="ctr">
+          <a:solidFill>
+            <a:schemeClr val="lt1">
+              <a:hueOff val="0"/>
+              <a:satOff val="0"/>
+              <a:lumOff val="0"/>
+              <a:alphaOff val="0"/>
+            </a:schemeClr>
+          </a:solidFill>
+          <a:prstDash val="solid"/>
+          <a:miter lim="800000"/>
+        </a:ln>
+        <a:effectLst/>
+      </dsp:spPr>
+      <dsp:style>
+        <a:lnRef idx="2">
+          <a:scrgbClr r="0" g="0" b="0"/>
+        </a:lnRef>
+        <a:fillRef idx="1">
+          <a:scrgbClr r="0" g="0" b="0"/>
+        </a:fillRef>
+        <a:effectRef idx="0">
+          <a:scrgbClr r="0" g="0" b="0"/>
+        </a:effectRef>
+        <a:fontRef idx="minor">
+          <a:schemeClr val="lt1"/>
+        </a:fontRef>
+      </dsp:style>
+      <dsp:txBody>
+        <a:bodyPr spcFirstLastPara="0" vert="horz" wrap="square" lIns="9525" tIns="9525" rIns="9525" bIns="9525" numCol="1" spcCol="1270" anchor="ctr" anchorCtr="0">
+          <a:noAutofit/>
+        </a:bodyPr>
+        <a:lstStyle/>
+        <a:p>
+          <a:pPr marL="0" lvl="0" indent="0" algn="ctr" defTabSz="666750">
+            <a:lnSpc>
+              <a:spcPct val="90000"/>
+            </a:lnSpc>
+            <a:spcBef>
+              <a:spcPct val="0"/>
+            </a:spcBef>
+            <a:spcAft>
+              <a:spcPct val="35000"/>
+            </a:spcAft>
+            <a:buNone/>
+          </a:pPr>
+          <a:r>
+            <a:rPr lang="en-SG" sz="1500" kern="1200" dirty="0"/>
+            <a:t>Hybrid electricity usage % (road only)</a:t>
+          </a:r>
+        </a:p>
+      </dsp:txBody>
+      <dsp:txXfrm>
+        <a:off x="4384795" y="6291209"/>
+        <a:ext cx="1825971" cy="556921"/>
       </dsp:txXfrm>
     </dsp:sp>
   </dsp:spTree>
@@ -11685,7 +11912,7 @@
           <a:p>
             <a:fld id="{26983E97-F64F-4682-9913-79CE9DD67B8D}" type="datetimeFigureOut">
               <a:rPr lang="en-US" smtClean="0"/>
-              <a:t>9/8/2022</a:t>
+              <a:t>9/14/2022</a:t>
             </a:fld>
             <a:endParaRPr lang="en-US"/>
           </a:p>
@@ -12155,7 +12382,7 @@
           <a:p>
             <a:fld id="{E176D876-29AB-498F-B931-06158B4302E6}" type="slidenum">
               <a:rPr lang="en-US" smtClean="0"/>
-              <a:t>12</a:t>
+              <a:t>13</a:t>
             </a:fld>
             <a:endParaRPr lang="en-US"/>
           </a:p>
@@ -12321,7 +12548,7 @@
           <a:p>
             <a:fld id="{17FB5843-0BFB-47EB-B97C-D0A00382D2AD}" type="datetimeFigureOut">
               <a:rPr lang="en-US" smtClean="0"/>
-              <a:t>9/8/2022</a:t>
+              <a:t>9/14/2022</a:t>
             </a:fld>
             <a:endParaRPr lang="en-US"/>
           </a:p>
@@ -12519,7 +12746,7 @@
           <a:p>
             <a:fld id="{17FB5843-0BFB-47EB-B97C-D0A00382D2AD}" type="datetimeFigureOut">
               <a:rPr lang="en-US" smtClean="0"/>
-              <a:t>9/8/2022</a:t>
+              <a:t>9/14/2022</a:t>
             </a:fld>
             <a:endParaRPr lang="en-US"/>
           </a:p>
@@ -12727,7 +12954,7 @@
           <a:p>
             <a:fld id="{17FB5843-0BFB-47EB-B97C-D0A00382D2AD}" type="datetimeFigureOut">
               <a:rPr lang="en-US" smtClean="0"/>
-              <a:t>9/8/2022</a:t>
+              <a:t>9/14/2022</a:t>
             </a:fld>
             <a:endParaRPr lang="en-US"/>
           </a:p>
@@ -12925,7 +13152,7 @@
           <a:p>
             <a:fld id="{17FB5843-0BFB-47EB-B97C-D0A00382D2AD}" type="datetimeFigureOut">
               <a:rPr lang="en-US" smtClean="0"/>
-              <a:t>9/8/2022</a:t>
+              <a:t>9/14/2022</a:t>
             </a:fld>
             <a:endParaRPr lang="en-US"/>
           </a:p>
@@ -13200,7 +13427,7 @@
           <a:p>
             <a:fld id="{17FB5843-0BFB-47EB-B97C-D0A00382D2AD}" type="datetimeFigureOut">
               <a:rPr lang="en-US" smtClean="0"/>
-              <a:t>9/8/2022</a:t>
+              <a:t>9/14/2022</a:t>
             </a:fld>
             <a:endParaRPr lang="en-US"/>
           </a:p>
@@ -13465,7 +13692,7 @@
           <a:p>
             <a:fld id="{17FB5843-0BFB-47EB-B97C-D0A00382D2AD}" type="datetimeFigureOut">
               <a:rPr lang="en-US" smtClean="0"/>
-              <a:t>9/8/2022</a:t>
+              <a:t>9/14/2022</a:t>
             </a:fld>
             <a:endParaRPr lang="en-US"/>
           </a:p>
@@ -13877,7 +14104,7 @@
           <a:p>
             <a:fld id="{17FB5843-0BFB-47EB-B97C-D0A00382D2AD}" type="datetimeFigureOut">
               <a:rPr lang="en-US" smtClean="0"/>
-              <a:t>9/8/2022</a:t>
+              <a:t>9/14/2022</a:t>
             </a:fld>
             <a:endParaRPr lang="en-US"/>
           </a:p>
@@ -14018,7 +14245,7 @@
           <a:p>
             <a:fld id="{17FB5843-0BFB-47EB-B97C-D0A00382D2AD}" type="datetimeFigureOut">
               <a:rPr lang="en-US" smtClean="0"/>
-              <a:t>9/8/2022</a:t>
+              <a:t>9/14/2022</a:t>
             </a:fld>
             <a:endParaRPr lang="en-US"/>
           </a:p>
@@ -14131,7 +14358,7 @@
           <a:p>
             <a:fld id="{17FB5843-0BFB-47EB-B97C-D0A00382D2AD}" type="datetimeFigureOut">
               <a:rPr lang="en-US" smtClean="0"/>
-              <a:t>9/8/2022</a:t>
+              <a:t>9/14/2022</a:t>
             </a:fld>
             <a:endParaRPr lang="en-US"/>
           </a:p>
@@ -14442,7 +14669,7 @@
           <a:p>
             <a:fld id="{17FB5843-0BFB-47EB-B97C-D0A00382D2AD}" type="datetimeFigureOut">
               <a:rPr lang="en-US" smtClean="0"/>
-              <a:t>9/8/2022</a:t>
+              <a:t>9/14/2022</a:t>
             </a:fld>
             <a:endParaRPr lang="en-US"/>
           </a:p>
@@ -14730,7 +14957,7 @@
           <a:p>
             <a:fld id="{17FB5843-0BFB-47EB-B97C-D0A00382D2AD}" type="datetimeFigureOut">
               <a:rPr lang="en-US" smtClean="0"/>
-              <a:t>9/8/2022</a:t>
+              <a:t>9/14/2022</a:t>
             </a:fld>
             <a:endParaRPr lang="en-US"/>
           </a:p>
@@ -14971,7 +15198,7 @@
           <a:p>
             <a:fld id="{17FB5843-0BFB-47EB-B97C-D0A00382D2AD}" type="datetimeFigureOut">
               <a:rPr lang="en-US" smtClean="0"/>
-              <a:t>9/8/2022</a:t>
+              <a:t>9/14/2022</a:t>
             </a:fld>
             <a:endParaRPr lang="en-US"/>
           </a:p>
@@ -15476,6 +15703,162 @@
           <p:cNvPr id="2" name="Title 1">
             <a:extLst>
               <a:ext uri="{FF2B5EF4-FFF2-40B4-BE49-F238E27FC236}">
+                <a16:creationId xmlns:a16="http://schemas.microsoft.com/office/drawing/2014/main" id="{27B7DFC0-EAF2-B13D-FB8A-257BFF3383A3}"/>
+              </a:ext>
+            </a:extLst>
+          </p:cNvPr>
+          <p:cNvSpPr>
+            <a:spLocks noGrp="1"/>
+          </p:cNvSpPr>
+          <p:nvPr>
+            <p:ph type="title"/>
+          </p:nvPr>
+        </p:nvSpPr>
+        <p:spPr/>
+        <p:txBody>
+          <a:bodyPr/>
+          <a:lstStyle/>
+          <a:p>
+            <a:r>
+              <a:rPr lang="en-US" dirty="0"/>
+              <a:t>Vehicle sales distribution</a:t>
+            </a:r>
+            <a:endParaRPr lang="en-SG" dirty="0"/>
+          </a:p>
+        </p:txBody>
+      </p:sp>
+      <p:sp>
+        <p:nvSpPr>
+          <p:cNvPr id="3" name="Content Placeholder 2">
+            <a:extLst>
+              <a:ext uri="{FF2B5EF4-FFF2-40B4-BE49-F238E27FC236}">
+                <a16:creationId xmlns:a16="http://schemas.microsoft.com/office/drawing/2014/main" id="{E9ADE592-037F-9112-A39A-71AD82121258}"/>
+              </a:ext>
+            </a:extLst>
+          </p:cNvPr>
+          <p:cNvSpPr>
+            <a:spLocks noGrp="1"/>
+          </p:cNvSpPr>
+          <p:nvPr>
+            <p:ph idx="1"/>
+          </p:nvPr>
+        </p:nvSpPr>
+        <p:spPr/>
+        <p:txBody>
+          <a:bodyPr>
+            <a:normAutofit fontScale="92500" lnSpcReduction="20000"/>
+          </a:bodyPr>
+          <a:lstStyle/>
+          <a:p>
+            <a:r>
+              <a:rPr lang="en-US" dirty="0"/>
+              <a:t>The way new stocks are allocated each year is:</a:t>
+            </a:r>
+          </a:p>
+          <a:p>
+            <a:pPr lvl="1"/>
+            <a:r>
+              <a:rPr lang="en-US" dirty="0"/>
+              <a:t>Distribution of sales for each vehicle/drive type within passenger or freight transport that adds up to 1</a:t>
+            </a:r>
+          </a:p>
+          <a:p>
+            <a:pPr lvl="1"/>
+            <a:r>
+              <a:rPr lang="en-US" dirty="0"/>
+              <a:t>Each year there is a set amount of activity that needs to be satisfied by transport in each transport type. The stock sales distribution determines what vehicles and drives the activity is satisfied by.</a:t>
+            </a:r>
+          </a:p>
+          <a:p>
+            <a:pPr lvl="2"/>
+            <a:r>
+              <a:rPr lang="en-US" dirty="0"/>
+              <a:t>Using the expected activity per vehicle stock (varies with </a:t>
+            </a:r>
+            <a:r>
+              <a:rPr lang="en-US" dirty="0" err="1"/>
+              <a:t>occupany_load_rate</a:t>
+            </a:r>
+            <a:r>
+              <a:rPr lang="en-US" dirty="0"/>
+              <a:t>), calculate the amount of new stocks needed to calculate that new activity.</a:t>
+            </a:r>
+          </a:p>
+          <a:p>
+            <a:pPr lvl="2"/>
+            <a:r>
+              <a:rPr lang="en-US" dirty="0"/>
+              <a:t>New activity needed each year is the sum of turnover, surplus stocks and activity growth from macro growth.</a:t>
+            </a:r>
+          </a:p>
+          <a:p>
+            <a:r>
+              <a:rPr lang="en-US" dirty="0"/>
+              <a:t>Chose this way because it is:</a:t>
+            </a:r>
+          </a:p>
+          <a:p>
+            <a:pPr lvl="1"/>
+            <a:r>
+              <a:rPr lang="en-US" dirty="0"/>
+              <a:t>Semi-realistic view of real world</a:t>
+            </a:r>
+          </a:p>
+          <a:p>
+            <a:pPr lvl="1"/>
+            <a:r>
+              <a:rPr lang="en-US" dirty="0"/>
+              <a:t>Easy to think about when working with the input data (vehicle sales distribution)</a:t>
+            </a:r>
+          </a:p>
+          <a:p>
+            <a:pPr lvl="1"/>
+            <a:r>
+              <a:rPr lang="en-US" dirty="0"/>
+              <a:t>Can identify what distribution of sales are actually needed to reach goals.</a:t>
+            </a:r>
+          </a:p>
+          <a:p>
+            <a:pPr lvl="2"/>
+            <a:endParaRPr lang="en-US" dirty="0"/>
+          </a:p>
+        </p:txBody>
+      </p:sp>
+    </p:spTree>
+    <p:extLst>
+      <p:ext uri="{BB962C8B-B14F-4D97-AF65-F5344CB8AC3E}">
+        <p14:creationId xmlns:p14="http://schemas.microsoft.com/office/powerpoint/2010/main" val="3489975365"/>
+      </p:ext>
+    </p:extLst>
+  </p:cSld>
+  <p:clrMapOvr>
+    <a:masterClrMapping/>
+  </p:clrMapOvr>
+</p:sld>
+</file>
+
+<file path=ppt/slides/slide11.xml><?xml version="1.0" encoding="utf-8"?>
+<p:sld xmlns:a="http://schemas.openxmlformats.org/drawingml/2006/main" xmlns:r="http://schemas.openxmlformats.org/officeDocument/2006/relationships" xmlns:p="http://schemas.openxmlformats.org/presentationml/2006/main" show="0">
+  <p:cSld>
+    <p:spTree>
+      <p:nvGrpSpPr>
+        <p:cNvPr id="1" name=""/>
+        <p:cNvGrpSpPr/>
+        <p:nvPr/>
+      </p:nvGrpSpPr>
+      <p:grpSpPr>
+        <a:xfrm>
+          <a:off x="0" y="0"/>
+          <a:ext cx="0" cy="0"/>
+          <a:chOff x="0" y="0"/>
+          <a:chExt cx="0" cy="0"/>
+        </a:xfrm>
+      </p:grpSpPr>
+      <p:sp>
+        <p:nvSpPr>
+          <p:cNvPr id="2" name="Title 1">
+            <a:extLst>
+              <a:ext uri="{FF2B5EF4-FFF2-40B4-BE49-F238E27FC236}">
                 <a16:creationId xmlns:a16="http://schemas.microsoft.com/office/drawing/2014/main" id="{E53DED3F-14D5-72D8-23B6-824BE1BF87B1}"/>
               </a:ext>
             </a:extLst>
@@ -15551,7 +15934,7 @@
 </p:sld>
 </file>
 
-<file path=ppt/slides/slide11.xml><?xml version="1.0" encoding="utf-8"?>
+<file path=ppt/slides/slide12.xml><?xml version="1.0" encoding="utf-8"?>
 <p:sld xmlns:a="http://schemas.openxmlformats.org/drawingml/2006/main" xmlns:r="http://schemas.openxmlformats.org/officeDocument/2006/relationships" xmlns:p="http://schemas.openxmlformats.org/presentationml/2006/main">
   <p:cSld>
     <p:spTree>
@@ -15649,7 +16032,7 @@
 </p:sld>
 </file>
 
-<file path=ppt/slides/slide12.xml><?xml version="1.0" encoding="utf-8"?>
+<file path=ppt/slides/slide13.xml><?xml version="1.0" encoding="utf-8"?>
 <p:sld xmlns:a="http://schemas.openxmlformats.org/drawingml/2006/main" xmlns:r="http://schemas.openxmlformats.org/officeDocument/2006/relationships" xmlns:p="http://schemas.openxmlformats.org/presentationml/2006/main" show="0">
   <p:cSld>
     <p:spTree>
@@ -15760,7 +16143,7 @@
 </p:sld>
 </file>
 
-<file path=ppt/slides/slide13.xml><?xml version="1.0" encoding="utf-8"?>
+<file path=ppt/slides/slide14.xml><?xml version="1.0" encoding="utf-8"?>
 <p:sld xmlns:a="http://schemas.openxmlformats.org/drawingml/2006/main" xmlns:r="http://schemas.openxmlformats.org/officeDocument/2006/relationships" xmlns:p="http://schemas.openxmlformats.org/presentationml/2006/main" show="0">
   <p:cSld>
     <p:spTree>
@@ -15856,7 +16239,7 @@
 </p:sld>
 </file>
 
-<file path=ppt/slides/slide14.xml><?xml version="1.0" encoding="utf-8"?>
+<file path=ppt/slides/slide15.xml><?xml version="1.0" encoding="utf-8"?>
 <p:sld xmlns:a="http://schemas.openxmlformats.org/drawingml/2006/main" xmlns:r="http://schemas.openxmlformats.org/officeDocument/2006/relationships" xmlns:p="http://schemas.openxmlformats.org/presentationml/2006/main" show="0">
   <p:cSld>
     <p:spTree>
@@ -15960,7 +16343,7 @@
 </p:sld>
 </file>
 
-<file path=ppt/slides/slide15.xml><?xml version="1.0" encoding="utf-8"?>
+<file path=ppt/slides/slide16.xml><?xml version="1.0" encoding="utf-8"?>
 <p:sld xmlns:a="http://schemas.openxmlformats.org/drawingml/2006/main" xmlns:r="http://schemas.openxmlformats.org/officeDocument/2006/relationships" xmlns:p="http://schemas.openxmlformats.org/presentationml/2006/main" show="0">
   <p:cSld>
     <p:spTree>
@@ -16075,7 +16458,7 @@
 </p:sld>
 </file>
 
-<file path=ppt/slides/slide16.xml><?xml version="1.0" encoding="utf-8"?>
+<file path=ppt/slides/slide17.xml><?xml version="1.0" encoding="utf-8"?>
 <p:sld xmlns:a="http://schemas.openxmlformats.org/drawingml/2006/main" xmlns:r="http://schemas.openxmlformats.org/officeDocument/2006/relationships" xmlns:p="http://schemas.openxmlformats.org/presentationml/2006/main" show="0">
   <p:cSld>
     <p:spTree>
@@ -16212,7 +16595,7 @@
 </p:sld>
 </file>
 
-<file path=ppt/slides/slide17.xml><?xml version="1.0" encoding="utf-8"?>
+<file path=ppt/slides/slide18.xml><?xml version="1.0" encoding="utf-8"?>
 <p:sld xmlns:a="http://schemas.openxmlformats.org/drawingml/2006/main" xmlns:r="http://schemas.openxmlformats.org/officeDocument/2006/relationships" xmlns:p="http://schemas.openxmlformats.org/presentationml/2006/main" show="0">
   <p:cSld>
     <p:spTree>
@@ -16317,7 +16700,7 @@
 </p:sld>
 </file>
 
-<file path=ppt/slides/slide18.xml><?xml version="1.0" encoding="utf-8"?>
+<file path=ppt/slides/slide19.xml><?xml version="1.0" encoding="utf-8"?>
 <p:sld xmlns:a="http://schemas.openxmlformats.org/drawingml/2006/main" xmlns:r="http://schemas.openxmlformats.org/officeDocument/2006/relationships" xmlns:p="http://schemas.openxmlformats.org/presentationml/2006/main" show="0">
   <p:cSld>
     <p:spTree>
@@ -16467,7 +16850,7 @@
 </file>
 
 <file path=ppt/slides/slide2.xml><?xml version="1.0" encoding="utf-8"?>
-<p:sld xmlns:a="http://schemas.openxmlformats.org/drawingml/2006/main" xmlns:r="http://schemas.openxmlformats.org/officeDocument/2006/relationships" xmlns:p="http://schemas.openxmlformats.org/presentationml/2006/main">
+<p:sld xmlns:a="http://schemas.openxmlformats.org/drawingml/2006/main" xmlns:r="http://schemas.openxmlformats.org/officeDocument/2006/relationships" xmlns:p="http://schemas.openxmlformats.org/presentationml/2006/main" show="0">
   <p:cSld>
     <p:spTree>
       <p:nvGrpSpPr>
@@ -16526,11 +16909,10 @@
         </p:nvSpPr>
         <p:spPr/>
         <p:txBody>
-          <a:bodyPr/>
+          <a:bodyPr>
+            <a:normAutofit fontScale="47500" lnSpcReduction="20000"/>
+          </a:bodyPr>
           <a:lstStyle/>
-          <a:p>
-            <a:endParaRPr lang="en-US" dirty="0"/>
-          </a:p>
           <a:p>
             <a:pPr marL="0" indent="0">
               <a:buNone/>
@@ -16542,12 +16924,8 @@
           </a:p>
           <a:p>
             <a:r>
-              <a:rPr lang="en-US" dirty="0" err="1"/>
-              <a:t>Implememntation</a:t>
-            </a:r>
-            <a:r>
               <a:rPr lang="en-US" dirty="0"/>
-              <a:t> of </a:t>
+              <a:t>Implementation of </a:t>
             </a:r>
             <a:r>
               <a:rPr lang="en-US" dirty="0" err="1"/>
@@ -16571,6 +16949,127 @@
             <a:r>
               <a:rPr lang="en-SG" dirty="0"/>
               <a:t> file for communicating with people outside the model (e.g. EGEEC efficiency meetings, outlook scenario planning, presentations, etc.)</a:t>
+            </a:r>
+          </a:p>
+          <a:p>
+            <a:r>
+              <a:rPr lang="en-SG" dirty="0"/>
+              <a:t>Double check sales </a:t>
+            </a:r>
+            <a:r>
+              <a:rPr lang="en-SG" dirty="0" err="1"/>
+              <a:t>dists</a:t>
+            </a:r>
+            <a:r>
+              <a:rPr lang="en-SG" dirty="0"/>
+              <a:t> with 8</a:t>
+            </a:r>
+            <a:r>
+              <a:rPr lang="en-SG" baseline="30000" dirty="0"/>
+              <a:t>th</a:t>
+            </a:r>
+            <a:endParaRPr lang="en-SG" dirty="0"/>
+          </a:p>
+          <a:p>
+            <a:r>
+              <a:rPr lang="en-SG" dirty="0"/>
+              <a:t>Replicate an economy, maybe Thailand. </a:t>
+            </a:r>
+          </a:p>
+          <a:p>
+            <a:pPr lvl="1"/>
+            <a:r>
+              <a:rPr lang="en-SG" dirty="0"/>
+              <a:t>Then I will have an idea of how long it would take to configure a run and also how accurate the model is to what we expect </a:t>
+            </a:r>
+          </a:p>
+          <a:p>
+            <a:pPr lvl="2"/>
+            <a:r>
+              <a:rPr lang="en-SG" dirty="0"/>
+              <a:t>Time </a:t>
+            </a:r>
+            <a:r>
+              <a:rPr lang="en-SG" dirty="0" err="1"/>
+              <a:t>estiamtes</a:t>
+            </a:r>
+            <a:endParaRPr lang="en-SG" dirty="0"/>
+          </a:p>
+          <a:p>
+            <a:pPr lvl="2"/>
+            <a:r>
+              <a:rPr lang="en-SG" dirty="0" err="1"/>
+              <a:t>Accruacy</a:t>
+            </a:r>
+            <a:endParaRPr lang="en-SG" dirty="0"/>
+          </a:p>
+          <a:p>
+            <a:r>
+              <a:rPr lang="en-SG" dirty="0"/>
+              <a:t>What others will need from my output:</a:t>
+            </a:r>
+          </a:p>
+          <a:p>
+            <a:pPr lvl="1"/>
+            <a:r>
+              <a:rPr lang="en-SG" dirty="0"/>
+              <a:t>Electricity for power model</a:t>
+            </a:r>
+          </a:p>
+          <a:p>
+            <a:r>
+              <a:rPr lang="en-SG" dirty="0"/>
+              <a:t>Contact </a:t>
+            </a:r>
+            <a:r>
+              <a:rPr lang="en-SG" dirty="0" err="1"/>
+              <a:t>adb</a:t>
+            </a:r>
+            <a:endParaRPr lang="en-SG" dirty="0"/>
+          </a:p>
+          <a:p>
+            <a:r>
+              <a:rPr lang="en-SG" dirty="0"/>
+              <a:t>Work out how well iTEM works</a:t>
+            </a:r>
+          </a:p>
+          <a:p>
+            <a:r>
+              <a:rPr lang="en-SG" dirty="0"/>
+              <a:t>Non road vehicles and agricultural model</a:t>
+            </a:r>
+          </a:p>
+          <a:p>
+            <a:r>
+              <a:rPr lang="en-SG" dirty="0"/>
+              <a:t>Is the identity of the model still a ‘knowledge based’ model? </a:t>
+            </a:r>
+          </a:p>
+          <a:p>
+            <a:r>
+              <a:rPr lang="en-SG" dirty="0"/>
+              <a:t>Create a way to scale the data according to what may be happening in other models, e.g. increasing </a:t>
+            </a:r>
+            <a:r>
+              <a:rPr lang="en-SG" dirty="0" err="1"/>
+              <a:t>ev</a:t>
+            </a:r>
+            <a:r>
+              <a:rPr lang="en-SG" dirty="0"/>
+              <a:t> use, will increase mining, increasing agriculture may increase non road use?</a:t>
+            </a:r>
+          </a:p>
+          <a:p>
+            <a:r>
+              <a:rPr lang="en-SG" dirty="0"/>
+              <a:t>How to show effect of an economy focusing more on trains. Perhaps need some shifting of activity between the non-road and road model?</a:t>
+            </a:r>
+          </a:p>
+          <a:p>
+            <a:pPr lvl="1"/>
+            <a:r>
+              <a:rPr lang="en-SG" dirty="0"/>
+              <a:t>Could just incorporate it into the vehicle sales share model, and set travel km per stock to 1 for all non road? </a:t>
             </a:r>
           </a:p>
         </p:txBody>
@@ -16657,13 +17156,21 @@
           <a:p>
             <a:r>
               <a:rPr lang="en-US" dirty="0"/>
-              <a:t>Focus on the most important outputs from the model. How can I provide forecasts of those? (stocks and energy use.)</a:t>
+              <a:t>Focus on the most important outputs from the model. How can I provide forecasts of those? (stocks and energy use)</a:t>
             </a:r>
           </a:p>
           <a:p>
             <a:r>
               <a:rPr lang="en-US" dirty="0"/>
-              <a:t>Make it as easy as possible to use/understand, while keeping ability to change inputs.</a:t>
+              <a:t>Make it </a:t>
+            </a:r>
+            <a:r>
+              <a:rPr lang="en-US" i="1" dirty="0"/>
+              <a:t>relatively </a:t>
+            </a:r>
+            <a:r>
+              <a:rPr lang="en-US" dirty="0"/>
+              <a:t>easy to use/understand.</a:t>
             </a:r>
           </a:p>
           <a:p>
@@ -16681,23 +17188,9 @@
             </a:r>
           </a:p>
           <a:p>
-            <a:pPr lvl="1"/>
             <a:r>
               <a:rPr lang="en-US" dirty="0"/>
-              <a:t>Simulates the transport economy, providing a way to think about it too.</a:t>
-            </a:r>
-          </a:p>
-          <a:p>
-            <a:pPr lvl="1"/>
-            <a:r>
-              <a:rPr lang="en-US" dirty="0"/>
-              <a:t>Allows for ‘what if’ projections for research outside of outlook context.</a:t>
-            </a:r>
-          </a:p>
-          <a:p>
-            <a:r>
-              <a:rPr lang="en-US" dirty="0"/>
-              <a:t>Mathematically sound so I can be confident when outputs show something new.</a:t>
+              <a:t>Produce good documentation/methodology documents so that I can communicate my model with others (in and out of APERC)</a:t>
             </a:r>
           </a:p>
         </p:txBody>
@@ -16783,17 +17276,44 @@
           <a:p>
             <a:r>
               <a:rPr lang="en-US" dirty="0"/>
-              <a:t>I have made an effort to write my code in as simple a way as possible, so even someone not-proficient in python may be able to use it. (i.e. commenting, plain code, script-style code rather than creating and using functions)</a:t>
-            </a:r>
-          </a:p>
-          <a:p>
+              <a:t>Simple coding style (scripts, line by line)</a:t>
+            </a:r>
+          </a:p>
+          <a:p>
+            <a:r>
+              <a:rPr lang="en-US" dirty="0">
+                <a:hlinkClick r:id="rId2"/>
+              </a:rPr>
+              <a:t>https://github.com/asia-pacific-energy-research-centre/transport_model_9th_edition/wiki</a:t>
+            </a:r>
             <a:endParaRPr lang="en-US" dirty="0"/>
           </a:p>
           <a:p>
-            <a:endParaRPr lang="en-US" dirty="0"/>
-          </a:p>
-          <a:p>
-            <a:endParaRPr lang="en-US" dirty="0"/>
+            <a:pPr lvl="1"/>
+            <a:r>
+              <a:rPr lang="en-US" dirty="0"/>
+              <a:t>Publicly accessible</a:t>
+            </a:r>
+          </a:p>
+          <a:p>
+            <a:r>
+              <a:rPr lang="en-US" dirty="0"/>
+              <a:t>Documentation documents</a:t>
+            </a:r>
+          </a:p>
+          <a:p>
+            <a:pPr lvl="1"/>
+            <a:r>
+              <a:rPr lang="en-US" dirty="0"/>
+              <a:t>Excel simulation of model</a:t>
+            </a:r>
+          </a:p>
+          <a:p>
+            <a:pPr lvl="1"/>
+            <a:r>
+              <a:rPr lang="en-US" dirty="0"/>
+              <a:t>Word document</a:t>
+            </a:r>
           </a:p>
         </p:txBody>
       </p:sp>
@@ -16934,6 +17454,110 @@
 </file>
 
 <file path=ppt/slides/slide6.xml><?xml version="1.0" encoding="utf-8"?>
+<p:sld xmlns:a="http://schemas.openxmlformats.org/drawingml/2006/main" xmlns:r="http://schemas.openxmlformats.org/officeDocument/2006/relationships" xmlns:p="http://schemas.openxmlformats.org/presentationml/2006/main" show="0">
+  <p:cSld>
+    <p:spTree>
+      <p:nvGrpSpPr>
+        <p:cNvPr id="1" name=""/>
+        <p:cNvGrpSpPr/>
+        <p:nvPr/>
+      </p:nvGrpSpPr>
+      <p:grpSpPr>
+        <a:xfrm>
+          <a:off x="0" y="0"/>
+          <a:ext cx="0" cy="0"/>
+          <a:chOff x="0" y="0"/>
+          <a:chExt cx="0" cy="0"/>
+        </a:xfrm>
+      </p:grpSpPr>
+      <p:sp>
+        <p:nvSpPr>
+          <p:cNvPr id="2" name="Title 1">
+            <a:extLst>
+              <a:ext uri="{FF2B5EF4-FFF2-40B4-BE49-F238E27FC236}">
+                <a16:creationId xmlns:a16="http://schemas.microsoft.com/office/drawing/2014/main" id="{6C1FDD90-3045-49BA-6D76-0A0618094905}"/>
+              </a:ext>
+            </a:extLst>
+          </p:cNvPr>
+          <p:cNvSpPr>
+            <a:spLocks noGrp="1"/>
+          </p:cNvSpPr>
+          <p:nvPr>
+            <p:ph type="title"/>
+          </p:nvPr>
+        </p:nvSpPr>
+        <p:spPr/>
+        <p:txBody>
+          <a:bodyPr/>
+          <a:lstStyle/>
+          <a:p>
+            <a:r>
+              <a:rPr lang="en-SG" dirty="0"/>
+              <a:t>Things it would help me for us to focus on</a:t>
+            </a:r>
+          </a:p>
+        </p:txBody>
+      </p:sp>
+      <p:sp>
+        <p:nvSpPr>
+          <p:cNvPr id="3" name="Content Placeholder 2">
+            <a:extLst>
+              <a:ext uri="{FF2B5EF4-FFF2-40B4-BE49-F238E27FC236}">
+                <a16:creationId xmlns:a16="http://schemas.microsoft.com/office/drawing/2014/main" id="{13B6C549-ABDD-4252-4C4A-3416B4FED7E8}"/>
+              </a:ext>
+            </a:extLst>
+          </p:cNvPr>
+          <p:cNvSpPr>
+            <a:spLocks noGrp="1"/>
+          </p:cNvSpPr>
+          <p:nvPr>
+            <p:ph idx="1"/>
+          </p:nvPr>
+        </p:nvSpPr>
+        <p:spPr/>
+        <p:txBody>
+          <a:bodyPr/>
+          <a:lstStyle/>
+          <a:p>
+            <a:r>
+              <a:rPr lang="en-SG" dirty="0"/>
+              <a:t>Choosing a base year</a:t>
+            </a:r>
+          </a:p>
+          <a:p>
+            <a:pPr lvl="1"/>
+            <a:r>
+              <a:rPr lang="en-SG" dirty="0"/>
+              <a:t>It seems that if we don’t choose 2019 as base year, we should choose 2023, but this will be difficult to guarantee data for.</a:t>
+            </a:r>
+          </a:p>
+          <a:p>
+            <a:pPr lvl="1"/>
+            <a:r>
+              <a:rPr lang="en-SG" dirty="0"/>
+              <a:t>Important because it is important to know what years I need data for when I ask people for it</a:t>
+            </a:r>
+          </a:p>
+          <a:p>
+            <a:pPr lvl="1"/>
+            <a:endParaRPr lang="en-SG" dirty="0"/>
+          </a:p>
+        </p:txBody>
+      </p:sp>
+    </p:spTree>
+    <p:extLst>
+      <p:ext uri="{BB962C8B-B14F-4D97-AF65-F5344CB8AC3E}">
+        <p14:creationId xmlns:p14="http://schemas.microsoft.com/office/powerpoint/2010/main" val="4103342698"/>
+      </p:ext>
+    </p:extLst>
+  </p:cSld>
+  <p:clrMapOvr>
+    <a:masterClrMapping/>
+  </p:clrMapOvr>
+</p:sld>
+</file>
+
+<file path=ppt/slides/slide7.xml><?xml version="1.0" encoding="utf-8"?>
 <p:sld xmlns:a="http://schemas.openxmlformats.org/drawingml/2006/main" xmlns:r="http://schemas.openxmlformats.org/officeDocument/2006/relationships" xmlns:p="http://schemas.openxmlformats.org/presentationml/2006/main">
   <p:cSld>
     <p:spTree>
@@ -18210,7 +18834,7 @@
 </p:sld>
 </file>
 
-<file path=ppt/slides/slide7.xml><?xml version="1.0" encoding="utf-8"?>
+<file path=ppt/slides/slide8.xml><?xml version="1.0" encoding="utf-8"?>
 <p:sld xmlns:a="http://schemas.openxmlformats.org/drawingml/2006/main" xmlns:r="http://schemas.openxmlformats.org/officeDocument/2006/relationships" xmlns:p="http://schemas.openxmlformats.org/presentationml/2006/main">
   <p:cSld>
     <p:spTree>
@@ -18227,34 +18851,6 @@
           <a:chExt cx="0" cy="0"/>
         </a:xfrm>
       </p:grpSpPr>
-      <p:graphicFrame>
-        <p:nvGraphicFramePr>
-          <p:cNvPr id="4" name="Diagram 3">
-            <a:extLst>
-              <a:ext uri="{FF2B5EF4-FFF2-40B4-BE49-F238E27FC236}">
-                <a16:creationId xmlns:a16="http://schemas.microsoft.com/office/drawing/2014/main" id="{A3AD1911-83B4-4384-B4CB-726E3856AC5C}"/>
-              </a:ext>
-            </a:extLst>
-          </p:cNvPr>
-          <p:cNvGraphicFramePr/>
-          <p:nvPr>
-            <p:extLst>
-              <p:ext uri="{D42A27DB-BD31-4B8C-83A1-F6EECF244321}">
-                <p14:modId xmlns:p14="http://schemas.microsoft.com/office/powerpoint/2010/main" val="1995851363"/>
-              </p:ext>
-            </p:extLst>
-          </p:nvPr>
-        </p:nvGraphicFramePr>
-        <p:xfrm>
-          <a:off x="232783" y="-1011621"/>
-          <a:ext cx="8071945" cy="8881242"/>
-        </p:xfrm>
-        <a:graphic>
-          <a:graphicData uri="http://schemas.openxmlformats.org/drawingml/2006/diagram">
-            <dgm:relIds xmlns:dgm="http://schemas.openxmlformats.org/drawingml/2006/diagram" xmlns:r="http://schemas.openxmlformats.org/officeDocument/2006/relationships" r:dm="rId2" r:lo="rId3" r:qs="rId4" r:cs="rId5"/>
-          </a:graphicData>
-        </a:graphic>
-      </p:graphicFrame>
       <p:sp>
         <p:nvSpPr>
           <p:cNvPr id="7" name="TextBox 6">
@@ -18294,6 +18890,34 @@
           </a:p>
         </p:txBody>
       </p:sp>
+      <p:graphicFrame>
+        <p:nvGraphicFramePr>
+          <p:cNvPr id="3" name="Diagram 2">
+            <a:extLst>
+              <a:ext uri="{FF2B5EF4-FFF2-40B4-BE49-F238E27FC236}">
+                <a16:creationId xmlns:a16="http://schemas.microsoft.com/office/drawing/2014/main" id="{DB327D16-88AC-5CE4-2B71-C2F2C49730EC}"/>
+              </a:ext>
+            </a:extLst>
+          </p:cNvPr>
+          <p:cNvGraphicFramePr/>
+          <p:nvPr>
+            <p:extLst>
+              <p:ext uri="{D42A27DB-BD31-4B8C-83A1-F6EECF244321}">
+                <p14:modId xmlns:p14="http://schemas.microsoft.com/office/powerpoint/2010/main" val="2994254390"/>
+              </p:ext>
+            </p:extLst>
+          </p:nvPr>
+        </p:nvGraphicFramePr>
+        <p:xfrm>
+          <a:off x="890954" y="0"/>
+          <a:ext cx="6213232" cy="6858000"/>
+        </p:xfrm>
+        <a:graphic>
+          <a:graphicData uri="http://schemas.openxmlformats.org/drawingml/2006/diagram">
+            <dgm:relIds xmlns:dgm="http://schemas.openxmlformats.org/drawingml/2006/diagram" xmlns:r="http://schemas.openxmlformats.org/officeDocument/2006/relationships" r:dm="rId2" r:lo="rId3" r:qs="rId4" r:cs="rId5"/>
+          </a:graphicData>
+        </a:graphic>
+      </p:graphicFrame>
     </p:spTree>
     <p:extLst>
       <p:ext uri="{BB962C8B-B14F-4D97-AF65-F5344CB8AC3E}">
@@ -18307,7 +18931,7 @@
 </p:sld>
 </file>
 
-<file path=ppt/slides/slide8.xml><?xml version="1.0" encoding="utf-8"?>
+<file path=ppt/slides/slide9.xml><?xml version="1.0" encoding="utf-8"?>
 <p:sld xmlns:a="http://schemas.openxmlformats.org/drawingml/2006/main" xmlns:r="http://schemas.openxmlformats.org/officeDocument/2006/relationships" xmlns:p="http://schemas.openxmlformats.org/presentationml/2006/main">
   <p:cSld>
     <p:spTree>
@@ -18382,7 +19006,17 @@
           <a:p>
             <a:r>
               <a:rPr lang="en-US" dirty="0"/>
-              <a:t>These can all be defined by the user before running the model. Some are unlikely to be changed, such as turnover and occupancy, but some have a lot of effect on the output from the model, such as vehicle sales share and efficiency growth.</a:t>
+              <a:t>These can all be defined by the user before running the model. </a:t>
+            </a:r>
+          </a:p>
+          <a:p>
+            <a:pPr marL="285750" indent="-285750">
+              <a:buFont typeface="Arial" panose="020B0604020202020204" pitchFamily="34" charset="0"/>
+              <a:buChar char="•"/>
+            </a:pPr>
+            <a:r>
+              <a:rPr lang="en-US" sz="1800" i="1" dirty="0"/>
+              <a:t>Some are unlikely to be changed, such as turnover and occupancy, but some have a lot of effect on the output from the model, such as vehicle sales share and efficiency growth.</a:t>
             </a:r>
           </a:p>
           <a:p>
@@ -18391,7 +19025,7 @@
           <a:p>
             <a:r>
               <a:rPr lang="en-US" dirty="0"/>
-              <a:t>They can also just be set to 0 so that there is no change in them and we use the base year data. This reduces complexity at no cost.</a:t>
+              <a:t>They can also just be set to 1 or 0 so that they have no effect. This reduces complexity at no cost.</a:t>
             </a:r>
           </a:p>
         </p:txBody>
@@ -18400,162 +19034,6 @@
     <p:extLst>
       <p:ext uri="{BB962C8B-B14F-4D97-AF65-F5344CB8AC3E}">
         <p14:creationId xmlns:p14="http://schemas.microsoft.com/office/powerpoint/2010/main" val="1398491340"/>
-      </p:ext>
-    </p:extLst>
-  </p:cSld>
-  <p:clrMapOvr>
-    <a:masterClrMapping/>
-  </p:clrMapOvr>
-</p:sld>
-</file>
-
-<file path=ppt/slides/slide9.xml><?xml version="1.0" encoding="utf-8"?>
-<p:sld xmlns:a="http://schemas.openxmlformats.org/drawingml/2006/main" xmlns:r="http://schemas.openxmlformats.org/officeDocument/2006/relationships" xmlns:p="http://schemas.openxmlformats.org/presentationml/2006/main">
-  <p:cSld>
-    <p:spTree>
-      <p:nvGrpSpPr>
-        <p:cNvPr id="1" name=""/>
-        <p:cNvGrpSpPr/>
-        <p:nvPr/>
-      </p:nvGrpSpPr>
-      <p:grpSpPr>
-        <a:xfrm>
-          <a:off x="0" y="0"/>
-          <a:ext cx="0" cy="0"/>
-          <a:chOff x="0" y="0"/>
-          <a:chExt cx="0" cy="0"/>
-        </a:xfrm>
-      </p:grpSpPr>
-      <p:sp>
-        <p:nvSpPr>
-          <p:cNvPr id="2" name="Title 1">
-            <a:extLst>
-              <a:ext uri="{FF2B5EF4-FFF2-40B4-BE49-F238E27FC236}">
-                <a16:creationId xmlns:a16="http://schemas.microsoft.com/office/drawing/2014/main" id="{27B7DFC0-EAF2-B13D-FB8A-257BFF3383A3}"/>
-              </a:ext>
-            </a:extLst>
-          </p:cNvPr>
-          <p:cNvSpPr>
-            <a:spLocks noGrp="1"/>
-          </p:cNvSpPr>
-          <p:nvPr>
-            <p:ph type="title"/>
-          </p:nvPr>
-        </p:nvSpPr>
-        <p:spPr/>
-        <p:txBody>
-          <a:bodyPr/>
-          <a:lstStyle/>
-          <a:p>
-            <a:r>
-              <a:rPr lang="en-US" dirty="0"/>
-              <a:t>Vehicle sales distribution</a:t>
-            </a:r>
-            <a:endParaRPr lang="en-SG" dirty="0"/>
-          </a:p>
-        </p:txBody>
-      </p:sp>
-      <p:sp>
-        <p:nvSpPr>
-          <p:cNvPr id="3" name="Content Placeholder 2">
-            <a:extLst>
-              <a:ext uri="{FF2B5EF4-FFF2-40B4-BE49-F238E27FC236}">
-                <a16:creationId xmlns:a16="http://schemas.microsoft.com/office/drawing/2014/main" id="{E9ADE592-037F-9112-A39A-71AD82121258}"/>
-              </a:ext>
-            </a:extLst>
-          </p:cNvPr>
-          <p:cNvSpPr>
-            <a:spLocks noGrp="1"/>
-          </p:cNvSpPr>
-          <p:nvPr>
-            <p:ph idx="1"/>
-          </p:nvPr>
-        </p:nvSpPr>
-        <p:spPr/>
-        <p:txBody>
-          <a:bodyPr>
-            <a:normAutofit fontScale="92500" lnSpcReduction="20000"/>
-          </a:bodyPr>
-          <a:lstStyle/>
-          <a:p>
-            <a:r>
-              <a:rPr lang="en-US" dirty="0"/>
-              <a:t>The way new stocks are allocated each year is:</a:t>
-            </a:r>
-          </a:p>
-          <a:p>
-            <a:pPr lvl="1"/>
-            <a:r>
-              <a:rPr lang="en-US" dirty="0"/>
-              <a:t>Distribution of sales for each vehicle/drive type within passenger or freight transport that adds up to 1</a:t>
-            </a:r>
-          </a:p>
-          <a:p>
-            <a:pPr lvl="1"/>
-            <a:r>
-              <a:rPr lang="en-US" dirty="0"/>
-              <a:t>Each year there is a set amount of activity that needs to be satisfied by transport in each transport type. The stock sales distribution determines what vehicles and drives the activity is satisfied by.</a:t>
-            </a:r>
-          </a:p>
-          <a:p>
-            <a:pPr lvl="2"/>
-            <a:r>
-              <a:rPr lang="en-US" dirty="0"/>
-              <a:t>Using the expected activity per vehicle stock (varies with </a:t>
-            </a:r>
-            <a:r>
-              <a:rPr lang="en-US" dirty="0" err="1"/>
-              <a:t>occupany_load_rate</a:t>
-            </a:r>
-            <a:r>
-              <a:rPr lang="en-US" dirty="0"/>
-              <a:t>), calculate the amount of new stocks needed to calculate that new activity.</a:t>
-            </a:r>
-          </a:p>
-          <a:p>
-            <a:pPr lvl="2"/>
-            <a:r>
-              <a:rPr lang="en-US" dirty="0"/>
-              <a:t>New activity needed each year is the sum of turnover, surplus stocks and activity growth from macro growth.</a:t>
-            </a:r>
-          </a:p>
-          <a:p>
-            <a:r>
-              <a:rPr lang="en-US" dirty="0"/>
-              <a:t>Chose this way because it is:</a:t>
-            </a:r>
-          </a:p>
-          <a:p>
-            <a:pPr lvl="1"/>
-            <a:r>
-              <a:rPr lang="en-US" dirty="0"/>
-              <a:t>Semi-realistic view of real world</a:t>
-            </a:r>
-          </a:p>
-          <a:p>
-            <a:pPr lvl="1"/>
-            <a:r>
-              <a:rPr lang="en-US" dirty="0"/>
-              <a:t>Easy to think about when working with the input data (vehicle sales distribution)</a:t>
-            </a:r>
-          </a:p>
-          <a:p>
-            <a:pPr lvl="1"/>
-            <a:r>
-              <a:rPr lang="en-US" dirty="0"/>
-              <a:t>Can identify what distribution of sales are actually needed to reach goals.</a:t>
-            </a:r>
-          </a:p>
-          <a:p>
-            <a:pPr lvl="2"/>
-            <a:endParaRPr lang="en-US" dirty="0"/>
-          </a:p>
-        </p:txBody>
-      </p:sp>
-    </p:spTree>
-    <p:extLst>
-      <p:ext uri="{BB962C8B-B14F-4D97-AF65-F5344CB8AC3E}">
-        <p14:creationId xmlns:p14="http://schemas.microsoft.com/office/powerpoint/2010/main" val="3489975365"/>
       </p:ext>
     </p:extLst>
   </p:cSld>

</xml_diff>